<commit_message>
Triggers listed as a table
</commit_message>
<xml_diff>
--- a/AzureFunctions.pptx
+++ b/AzureFunctions.pptx
@@ -5,7 +5,7 @@
     <p:sldMasterId id="2147483648" r:id="rId1"/>
   </p:sldMasterIdLst>
   <p:notesMasterIdLst>
-    <p:notesMasterId r:id="rId17"/>
+    <p:notesMasterId r:id="rId18"/>
   </p:notesMasterIdLst>
   <p:sldIdLst>
     <p:sldId id="257" r:id="rId2"/>
@@ -14,15 +14,16 @@
     <p:sldId id="263" r:id="rId5"/>
     <p:sldId id="260" r:id="rId6"/>
     <p:sldId id="266" r:id="rId7"/>
-    <p:sldId id="267" r:id="rId8"/>
-    <p:sldId id="264" r:id="rId9"/>
-    <p:sldId id="268" r:id="rId10"/>
+    <p:sldId id="268" r:id="rId8"/>
+    <p:sldId id="267" r:id="rId9"/>
+    <p:sldId id="264" r:id="rId10"/>
     <p:sldId id="269" r:id="rId11"/>
     <p:sldId id="270" r:id="rId12"/>
     <p:sldId id="271" r:id="rId13"/>
     <p:sldId id="272" r:id="rId14"/>
     <p:sldId id="273" r:id="rId15"/>
-    <p:sldId id="259" r:id="rId16"/>
+    <p:sldId id="274" r:id="rId16"/>
+    <p:sldId id="259" r:id="rId17"/>
   </p:sldIdLst>
   <p:sldSz cx="12192000" cy="6858000"/>
   <p:notesSz cx="6858000" cy="9144000"/>
@@ -3291,6 +3292,227 @@
           <a:bodyPr/>
           <a:lstStyle/>
           <a:p>
+            <a:pPr marL="0" marR="0" lvl="0" indent="0" algn="l" defTabSz="914400" rtl="0" eaLnBrk="1" fontAlgn="auto" latinLnBrk="0" hangingPunct="1">
+              <a:lnSpc>
+                <a:spcPct val="100000"/>
+              </a:lnSpc>
+              <a:spcBef>
+                <a:spcPts val="0"/>
+              </a:spcBef>
+              <a:spcAft>
+                <a:spcPts val="0"/>
+              </a:spcAft>
+              <a:buClrTx/>
+              <a:buSzTx/>
+              <a:buFontTx/>
+              <a:buNone/>
+              <a:tabLst/>
+              <a:defRPr/>
+            </a:pPr>
+            <a:r>
+              <a:rPr lang="en-US" dirty="0" err="1">
+                <a:latin typeface="Calibri" panose="020F0502020204030204" pitchFamily="34" charset="0"/>
+              </a:rPr>
+              <a:t>npm</a:t>
+            </a:r>
+            <a:r>
+              <a:rPr lang="en-US" dirty="0">
+                <a:latin typeface="Calibri" panose="020F0502020204030204" pitchFamily="34" charset="0"/>
+              </a:rPr>
+              <a:t> cli + command line: </a:t>
+            </a:r>
+            <a:r>
+              <a:rPr lang="en-US" dirty="0">
+                <a:latin typeface="Calibri" panose="020F0502020204030204" pitchFamily="34" charset="0"/>
+                <a:hlinkClick r:id="rId3"/>
+              </a:rPr>
+              <a:t>https://shellmonger.com/2016/10/31/creating-and-debugging-azure-functions-locally/</a:t>
+            </a:r>
+            <a:endParaRPr lang="en-CA" dirty="0"/>
+          </a:p>
+        </p:txBody>
+      </p:sp>
+      <p:sp>
+        <p:nvSpPr>
+          <p:cNvPr id="4" name="Slide Number Placeholder 3"/>
+          <p:cNvSpPr>
+            <a:spLocks noGrp="1"/>
+          </p:cNvSpPr>
+          <p:nvPr>
+            <p:ph type="sldNum" sz="quarter" idx="10"/>
+          </p:nvPr>
+        </p:nvSpPr>
+        <p:spPr/>
+        <p:txBody>
+          <a:bodyPr/>
+          <a:lstStyle/>
+          <a:p>
+            <a:fld id="{C7A977E6-84F1-4ABE-8B90-0EE8AE00C74E}" type="slidenum">
+              <a:rPr lang="en-CA" smtClean="0"/>
+              <a:t>14</a:t>
+            </a:fld>
+            <a:endParaRPr lang="en-CA"/>
+          </a:p>
+        </p:txBody>
+      </p:sp>
+    </p:spTree>
+    <p:extLst>
+      <p:ext uri="{BB962C8B-B14F-4D97-AF65-F5344CB8AC3E}">
+        <p14:creationId xmlns:p14="http://schemas.microsoft.com/office/powerpoint/2010/main" val="2487479288"/>
+      </p:ext>
+    </p:extLst>
+  </p:cSld>
+  <p:clrMapOvr>
+    <a:masterClrMapping/>
+  </p:clrMapOvr>
+</p:notes>
+</file>
+
+<file path=ppt/notesSlides/notesSlide3.xml><?xml version="1.0" encoding="utf-8"?>
+<p:notes xmlns:a="http://schemas.openxmlformats.org/drawingml/2006/main" xmlns:r="http://schemas.openxmlformats.org/officeDocument/2006/relationships" xmlns:p="http://schemas.openxmlformats.org/presentationml/2006/main">
+  <p:cSld>
+    <p:spTree>
+      <p:nvGrpSpPr>
+        <p:cNvPr id="1" name=""/>
+        <p:cNvGrpSpPr/>
+        <p:nvPr/>
+      </p:nvGrpSpPr>
+      <p:grpSpPr>
+        <a:xfrm>
+          <a:off x="0" y="0"/>
+          <a:ext cx="0" cy="0"/>
+          <a:chOff x="0" y="0"/>
+          <a:chExt cx="0" cy="0"/>
+        </a:xfrm>
+      </p:grpSpPr>
+      <p:sp>
+        <p:nvSpPr>
+          <p:cNvPr id="2" name="Slide Image Placeholder 1"/>
+          <p:cNvSpPr>
+            <a:spLocks noGrp="1" noRot="1" noChangeAspect="1"/>
+          </p:cNvSpPr>
+          <p:nvPr>
+            <p:ph type="sldImg"/>
+          </p:nvPr>
+        </p:nvSpPr>
+        <p:spPr/>
+      </p:sp>
+      <p:sp>
+        <p:nvSpPr>
+          <p:cNvPr id="3" name="Notes Placeholder 2"/>
+          <p:cNvSpPr>
+            <a:spLocks noGrp="1"/>
+          </p:cNvSpPr>
+          <p:nvPr>
+            <p:ph type="body" idx="1"/>
+          </p:nvPr>
+        </p:nvSpPr>
+        <p:spPr/>
+        <p:txBody>
+          <a:bodyPr/>
+          <a:lstStyle/>
+          <a:p>
+            <a:pPr marL="0" marR="0" lvl="0" indent="0" algn="l" defTabSz="914400" rtl="0" eaLnBrk="1" fontAlgn="auto" latinLnBrk="0" hangingPunct="1">
+              <a:lnSpc>
+                <a:spcPct val="100000"/>
+              </a:lnSpc>
+              <a:spcBef>
+                <a:spcPts val="0"/>
+              </a:spcBef>
+              <a:spcAft>
+                <a:spcPts val="0"/>
+              </a:spcAft>
+              <a:buClrTx/>
+              <a:buSzTx/>
+              <a:buFontTx/>
+              <a:buNone/>
+              <a:tabLst/>
+              <a:defRPr/>
+            </a:pPr>
+            <a:endParaRPr lang="en-CA" dirty="0"/>
+          </a:p>
+        </p:txBody>
+      </p:sp>
+      <p:sp>
+        <p:nvSpPr>
+          <p:cNvPr id="4" name="Slide Number Placeholder 3"/>
+          <p:cNvSpPr>
+            <a:spLocks noGrp="1"/>
+          </p:cNvSpPr>
+          <p:nvPr>
+            <p:ph type="sldNum" sz="quarter" idx="10"/>
+          </p:nvPr>
+        </p:nvSpPr>
+        <p:spPr/>
+        <p:txBody>
+          <a:bodyPr/>
+          <a:lstStyle/>
+          <a:p>
+            <a:fld id="{C7A977E6-84F1-4ABE-8B90-0EE8AE00C74E}" type="slidenum">
+              <a:rPr lang="en-CA" smtClean="0"/>
+              <a:t>15</a:t>
+            </a:fld>
+            <a:endParaRPr lang="en-CA"/>
+          </a:p>
+        </p:txBody>
+      </p:sp>
+    </p:spTree>
+    <p:extLst>
+      <p:ext uri="{BB962C8B-B14F-4D97-AF65-F5344CB8AC3E}">
+        <p14:creationId xmlns:p14="http://schemas.microsoft.com/office/powerpoint/2010/main" val="1464803533"/>
+      </p:ext>
+    </p:extLst>
+  </p:cSld>
+  <p:clrMapOvr>
+    <a:masterClrMapping/>
+  </p:clrMapOvr>
+</p:notes>
+</file>
+
+<file path=ppt/notesSlides/notesSlide4.xml><?xml version="1.0" encoding="utf-8"?>
+<p:notes xmlns:a="http://schemas.openxmlformats.org/drawingml/2006/main" xmlns:r="http://schemas.openxmlformats.org/officeDocument/2006/relationships" xmlns:p="http://schemas.openxmlformats.org/presentationml/2006/main">
+  <p:cSld>
+    <p:spTree>
+      <p:nvGrpSpPr>
+        <p:cNvPr id="1" name=""/>
+        <p:cNvGrpSpPr/>
+        <p:nvPr/>
+      </p:nvGrpSpPr>
+      <p:grpSpPr>
+        <a:xfrm>
+          <a:off x="0" y="0"/>
+          <a:ext cx="0" cy="0"/>
+          <a:chOff x="0" y="0"/>
+          <a:chExt cx="0" cy="0"/>
+        </a:xfrm>
+      </p:grpSpPr>
+      <p:sp>
+        <p:nvSpPr>
+          <p:cNvPr id="2" name="Slide Image Placeholder 1"/>
+          <p:cNvSpPr>
+            <a:spLocks noGrp="1" noRot="1" noChangeAspect="1"/>
+          </p:cNvSpPr>
+          <p:nvPr>
+            <p:ph type="sldImg"/>
+          </p:nvPr>
+        </p:nvSpPr>
+        <p:spPr/>
+      </p:sp>
+      <p:sp>
+        <p:nvSpPr>
+          <p:cNvPr id="3" name="Notes Placeholder 2"/>
+          <p:cNvSpPr>
+            <a:spLocks noGrp="1"/>
+          </p:cNvSpPr>
+          <p:nvPr>
+            <p:ph type="body" idx="1"/>
+          </p:nvPr>
+        </p:nvSpPr>
+        <p:spPr/>
+        <p:txBody>
+          <a:bodyPr/>
+          <a:lstStyle/>
+          <a:p>
             <a:endParaRPr lang="en-CA"/>
           </a:p>
         </p:txBody>
@@ -3312,7 +3534,7 @@
           <a:p>
             <a:fld id="{8FBC0A21-6C70-4DBD-9993-01A1989983DD}" type="slidenum">
               <a:rPr lang="en-CA" smtClean="0"/>
-              <a:t>15</a:t>
+              <a:t>16</a:t>
             </a:fld>
             <a:endParaRPr lang="en-CA"/>
           </a:p>
@@ -6562,7 +6784,7 @@
                   <a:schemeClr val="bg1"/>
                 </a:solidFill>
               </a:rPr>
-              <a:t>Code time</a:t>
+              <a:t>Demo: Monitored Thumbnail Generator</a:t>
             </a:r>
             <a:endParaRPr lang="en-CA" b="1" dirty="0">
               <a:solidFill>
@@ -6599,15 +6821,7 @@
             </a:pPr>
             <a:r>
               <a:rPr lang="en-US" sz="2800" dirty="0"/>
-              <a:t>Canonical </a:t>
-            </a:r>
-            <a:r>
-              <a:rPr lang="en-US" sz="2800"/>
-              <a:t>image resizing </a:t>
-            </a:r>
-            <a:r>
-              <a:rPr lang="en-US" sz="2800" dirty="0"/>
-              <a:t>service – get an image and generate thumbnails</a:t>
+              <a:t>Canonical image resizing service – get an image and generate a thumbnail</a:t>
             </a:r>
           </a:p>
           <a:p>
@@ -6616,57 +6830,26 @@
             </a:pPr>
             <a:r>
               <a:rPr lang="en-US" sz="2800" dirty="0"/>
-              <a:t>Handle failures</a:t>
+              <a:t>Handle failures by</a:t>
             </a:r>
           </a:p>
           <a:p>
             <a:pPr marL="971550" lvl="1" indent="-514350">
-              <a:buAutoNum type="arabicPeriod"/>
+              <a:buFont typeface="+mj-lt"/>
+              <a:buAutoNum type="alphaLcPeriod"/>
+            </a:pPr>
+            <a:r>
+              <a:rPr lang="en-US" sz="2800" dirty="0"/>
+              <a:t>Send notification</a:t>
+            </a:r>
+          </a:p>
+          <a:p>
+            <a:pPr marL="971550" lvl="1" indent="-514350">
+              <a:buAutoNum type="alphaLcPeriod"/>
             </a:pPr>
             <a:r>
               <a:rPr lang="en-US" sz="2800" dirty="0"/>
               <a:t>Create failure audits</a:t>
-            </a:r>
-          </a:p>
-          <a:p>
-            <a:pPr marL="971550" lvl="1" indent="-514350">
-              <a:buAutoNum type="arabicPeriod"/>
-            </a:pPr>
-            <a:r>
-              <a:rPr lang="en-US" sz="2800" dirty="0"/>
-              <a:t>Send notification(s)</a:t>
-            </a:r>
-          </a:p>
-        </p:txBody>
-      </p:sp>
-      <p:sp>
-        <p:nvSpPr>
-          <p:cNvPr id="2" name="Rectangle 1"/>
-          <p:cNvSpPr/>
-          <p:nvPr/>
-        </p:nvSpPr>
-        <p:spPr>
-          <a:xfrm>
-            <a:off x="1586753" y="4552141"/>
-            <a:ext cx="9018494" cy="369332"/>
-          </a:xfrm>
-          <a:prstGeom prst="rect">
-            <a:avLst/>
-          </a:prstGeom>
-        </p:spPr>
-        <p:txBody>
-          <a:bodyPr wrap="square">
-            <a:spAutoFit/>
-          </a:bodyPr>
-          <a:lstStyle/>
-          <a:p>
-            <a:r>
-              <a:rPr lang="en-CA" dirty="0" err="1"/>
-              <a:t>Twillio</a:t>
-            </a:r>
-            <a:r>
-              <a:rPr lang="en-CA" dirty="0"/>
-              <a:t>: https://docs.microsoft.com/en-us/azure/azure-functions/functions-bindings-twilio</a:t>
             </a:r>
           </a:p>
         </p:txBody>
@@ -6811,7 +6994,7 @@
                   <a:schemeClr val="bg1"/>
                 </a:solidFill>
               </a:rPr>
-              <a:t>Use case: Message deduplication</a:t>
+              <a:t>Use case: Message Deduplication</a:t>
             </a:r>
             <a:endParaRPr lang="en-CA" b="1" dirty="0">
               <a:solidFill>
@@ -6956,7 +7139,7 @@
                   <a:schemeClr val="bg1"/>
                 </a:solidFill>
               </a:rPr>
-              <a:t>Use case: ETL (failure audits)</a:t>
+              <a:t>Use case: ETL (Failure Auditing)</a:t>
             </a:r>
             <a:endParaRPr lang="en-CA" b="1" dirty="0">
               <a:solidFill>
@@ -7109,7 +7292,7 @@
                   <a:schemeClr val="bg1"/>
                 </a:solidFill>
               </a:rPr>
-              <a:t>notifier</a:t>
+              <a:t>Notifier</a:t>
             </a:r>
             <a:endParaRPr lang="en-CA" b="1" dirty="0">
               <a:solidFill>
@@ -18866,53 +19049,9 @@
           <a:p>
             <a:r>
               <a:rPr lang="en-CA">
-                <a:hlinkClick r:id="rId2"/>
+                <a:hlinkClick r:id="rId3"/>
               </a:rPr>
               <a:t>https://portal.azure.com/#blade/WebsitesExtension/FunctionsIFrameBlade/id/%2Fsubscriptions%2F97d311d3-b788-4002-87c0-cd8688165f76%2FresourceGroups%2FAzureFunctions-WestUS%2Fproviders%2FMicrosoft.Web%2Fsites%2Fxkcd</a:t>
-            </a:r>
-            <a:endParaRPr lang="en-CA" dirty="0"/>
-          </a:p>
-        </p:txBody>
-      </p:sp>
-      <p:sp>
-        <p:nvSpPr>
-          <p:cNvPr id="3" name="Rectangle 2"/>
-          <p:cNvSpPr/>
-          <p:nvPr/>
-        </p:nvSpPr>
-        <p:spPr>
-          <a:xfrm>
-            <a:off x="149411" y="1604700"/>
-            <a:ext cx="11797554" cy="369332"/>
-          </a:xfrm>
-          <a:prstGeom prst="rect">
-            <a:avLst/>
-          </a:prstGeom>
-        </p:spPr>
-        <p:txBody>
-          <a:bodyPr wrap="square">
-            <a:spAutoFit/>
-          </a:bodyPr>
-          <a:lstStyle/>
-          <a:p>
-            <a:r>
-              <a:rPr lang="en-US" dirty="0" err="1">
-                <a:latin typeface="Calibri" panose="020F0502020204030204" pitchFamily="34" charset="0"/>
-              </a:rPr>
-              <a:t>npm</a:t>
-            </a:r>
-            <a:r>
-              <a:rPr lang="en-US" dirty="0">
-                <a:latin typeface="Calibri" panose="020F0502020204030204" pitchFamily="34" charset="0"/>
-              </a:rPr>
-              <a:t> cli + command line: </a:t>
-            </a:r>
-            <a:r>
-              <a:rPr lang="en-US" dirty="0">
-                <a:latin typeface="Calibri" panose="020F0502020204030204" pitchFamily="34" charset="0"/>
-                <a:hlinkClick r:id="rId3"/>
-              </a:rPr>
-              <a:t>https://shellmonger.com/2016/10/31/creating-and-debugging-azure-functions-locally/</a:t>
             </a:r>
             <a:endParaRPr lang="en-CA" dirty="0"/>
           </a:p>
@@ -18926,8 +19065,8 @@
         </p:nvSpPr>
         <p:spPr>
           <a:xfrm>
-            <a:off x="149411" y="2376954"/>
-            <a:ext cx="6096000" cy="1815882"/>
+            <a:off x="149411" y="1673263"/>
+            <a:ext cx="6096000" cy="2677656"/>
           </a:xfrm>
           <a:prstGeom prst="rect">
             <a:avLst/>
@@ -18938,6 +19077,24 @@
             <a:spAutoFit/>
           </a:bodyPr>
           <a:lstStyle/>
+          <a:p>
+            <a:pPr marL="342900" fontAlgn="ctr"/>
+            <a:r>
+              <a:rPr lang="en-US" sz="2800" dirty="0">
+                <a:latin typeface="Calibri" panose="020F0502020204030204" pitchFamily="34" charset="0"/>
+              </a:rPr>
+              <a:t>NPM cli</a:t>
+            </a:r>
+          </a:p>
+          <a:p>
+            <a:pPr marL="342900" fontAlgn="ctr">
+              <a:buFont typeface="+mj-lt"/>
+              <a:buAutoNum type="arabicPeriod"/>
+            </a:pPr>
+            <a:endParaRPr lang="en-US" sz="2800" dirty="0">
+              <a:latin typeface="Calibri" panose="020F0502020204030204" pitchFamily="34" charset="0"/>
+            </a:endParaRPr>
+          </a:p>
           <a:p>
             <a:pPr marL="342900" fontAlgn="ctr">
               <a:buFont typeface="+mj-lt"/>
@@ -19053,6 +19210,112 @@
       </p:grpSpPr>
       <p:sp>
         <p:nvSpPr>
+          <p:cNvPr id="14" name="Title 1"/>
+          <p:cNvSpPr>
+            <a:spLocks noGrp="1"/>
+          </p:cNvSpPr>
+          <p:nvPr>
+            <p:ph type="title"/>
+          </p:nvPr>
+        </p:nvSpPr>
+        <p:spPr>
+          <a:xfrm>
+            <a:off x="0" y="0"/>
+            <a:ext cx="12192000" cy="1325563"/>
+          </a:xfrm>
+          <a:solidFill>
+            <a:srgbClr val="0070C0"/>
+          </a:solidFill>
+        </p:spPr>
+        <p:txBody>
+          <a:bodyPr/>
+          <a:lstStyle/>
+          <a:p>
+            <a:r>
+              <a:rPr lang="en-US" b="1" dirty="0">
+                <a:solidFill>
+                  <a:schemeClr val="bg1"/>
+                </a:solidFill>
+              </a:rPr>
+              <a:t>Q&amp;A</a:t>
+            </a:r>
+            <a:endParaRPr lang="en-CA" b="1" dirty="0">
+              <a:solidFill>
+                <a:schemeClr val="bg1"/>
+              </a:solidFill>
+            </a:endParaRPr>
+          </a:p>
+        </p:txBody>
+      </p:sp>
+      <p:sp>
+        <p:nvSpPr>
+          <p:cNvPr id="4" name="Rectangle 3"/>
+          <p:cNvSpPr/>
+          <p:nvPr/>
+        </p:nvSpPr>
+        <p:spPr>
+          <a:xfrm>
+            <a:off x="149411" y="1673263"/>
+            <a:ext cx="6096000" cy="523220"/>
+          </a:xfrm>
+          <a:prstGeom prst="rect">
+            <a:avLst/>
+          </a:prstGeom>
+        </p:spPr>
+        <p:txBody>
+          <a:bodyPr>
+            <a:spAutoFit/>
+          </a:bodyPr>
+          <a:lstStyle/>
+          <a:p>
+            <a:pPr marL="342900" fontAlgn="ctr"/>
+            <a:r>
+              <a:rPr lang="en-US" sz="2800" dirty="0">
+                <a:latin typeface="Calibri" panose="020F0502020204030204" pitchFamily="34" charset="0"/>
+              </a:rPr>
+              <a:t>Ask away!</a:t>
+            </a:r>
+            <a:endParaRPr lang="en-US" sz="4000" dirty="0">
+              <a:latin typeface="Calibri" panose="020F0502020204030204" pitchFamily="34" charset="0"/>
+            </a:endParaRPr>
+          </a:p>
+        </p:txBody>
+      </p:sp>
+    </p:spTree>
+    <p:extLst>
+      <p:ext uri="{BB962C8B-B14F-4D97-AF65-F5344CB8AC3E}">
+        <p14:creationId xmlns:p14="http://schemas.microsoft.com/office/powerpoint/2010/main" val="3196144523"/>
+      </p:ext>
+    </p:extLst>
+  </p:cSld>
+  <p:clrMapOvr>
+    <a:masterClrMapping/>
+  </p:clrMapOvr>
+  <p:transition>
+    <p:fade/>
+  </p:transition>
+</p:sld>
+</file>
+
+<file path=ppt/slides/slide16.xml><?xml version="1.0" encoding="utf-8"?>
+<p:sld xmlns:a="http://schemas.openxmlformats.org/drawingml/2006/main" xmlns:r="http://schemas.openxmlformats.org/officeDocument/2006/relationships" xmlns:p="http://schemas.openxmlformats.org/presentationml/2006/main">
+  <p:cSld>
+    <p:spTree>
+      <p:nvGrpSpPr>
+        <p:cNvPr id="1" name=""/>
+        <p:cNvGrpSpPr/>
+        <p:nvPr/>
+      </p:nvGrpSpPr>
+      <p:grpSpPr>
+        <a:xfrm>
+          <a:off x="0" y="0"/>
+          <a:ext cx="0" cy="0"/>
+          <a:chOff x="0" y="0"/>
+          <a:chExt cx="0" cy="0"/>
+        </a:xfrm>
+      </p:grpSpPr>
+      <p:sp>
+        <p:nvSpPr>
           <p:cNvPr id="2" name="Title 1"/>
           <p:cNvSpPr>
             <a:spLocks noGrp="1"/>
@@ -19094,7 +19357,7 @@
         <p:spPr>
           <a:xfrm>
             <a:off x="256449" y="1708347"/>
-            <a:ext cx="11276293" cy="3046988"/>
+            <a:ext cx="11276293" cy="3416320"/>
           </a:xfrm>
           <a:prstGeom prst="rect">
             <a:avLst/>
@@ -19191,6 +19454,23 @@
               <a:buChar char="•"/>
             </a:pPr>
             <a:r>
+              <a:rPr lang="en-CA" sz="2400" b="1" dirty="0"/>
+              <a:t>Azure Storage Explorer </a:t>
+            </a:r>
+            <a:r>
+              <a:rPr lang="en-CA" sz="2400" b="1" dirty="0">
+                <a:hlinkClick r:id="rId7"/>
+              </a:rPr>
+              <a:t>http://storageexplorer.com</a:t>
+            </a:r>
+            <a:endParaRPr lang="en-CA" sz="2400" b="1" dirty="0"/>
+          </a:p>
+          <a:p>
+            <a:pPr marL="342900" indent="-342900">
+              <a:buFont typeface="Arial" panose="020B0604020202020204" pitchFamily="34" charset="0"/>
+              <a:buChar char="•"/>
+            </a:pPr>
+            <a:r>
               <a:rPr lang="en-US" sz="2400" b="1" dirty="0" err="1"/>
               <a:t>npm</a:t>
             </a:r>
@@ -19200,7 +19480,7 @@
             </a:r>
             <a:r>
               <a:rPr lang="en-US" sz="2400" b="1" dirty="0">
-                <a:hlinkClick r:id="rId7"/>
+                <a:hlinkClick r:id="rId8"/>
               </a:rPr>
               <a:t>https://www.npmjs.com/package/azure-functions-cli</a:t>
             </a:r>
@@ -19217,7 +19497,7 @@
           <p:nvPr/>
         </p:nvPicPr>
         <p:blipFill>
-          <a:blip r:embed="rId8">
+          <a:blip r:embed="rId9">
             <a:extLst>
               <a:ext uri="{28A0092B-C50C-407E-A947-70E740481C1C}">
                 <a14:useLocalDpi xmlns:a14="http://schemas.microsoft.com/office/drawing/2010/main" val="0"/>
@@ -20081,7 +20361,7 @@
         </p:nvSpPr>
         <p:spPr>
           <a:xfrm>
-            <a:off x="0" y="0"/>
+            <a:off x="0" y="8753"/>
             <a:ext cx="12192000" cy="1325563"/>
           </a:xfrm>
           <a:solidFill>
@@ -22154,8 +22434,21 @@
                   <a:schemeClr val="bg1"/>
                 </a:solidFill>
               </a:rPr>
-              <a:t>Azure Functions architecture</a:t>
+              <a:t>Azure </a:t>
             </a:r>
+            <a:r>
+              <a:rPr lang="en-CA" b="1">
+                <a:solidFill>
+                  <a:schemeClr val="bg1"/>
+                </a:solidFill>
+              </a:rPr>
+              <a:t>Functions architecture</a:t>
+            </a:r>
+            <a:endParaRPr lang="en-CA" b="1" dirty="0">
+              <a:solidFill>
+                <a:schemeClr val="bg1"/>
+              </a:solidFill>
+            </a:endParaRPr>
           </a:p>
         </p:txBody>
       </p:sp>
@@ -22539,7 +22832,7 @@
                   <a:schemeClr val="bg1"/>
                 </a:solidFill>
               </a:rPr>
-              <a:t>Function Basics</a:t>
+              <a:t>Functions Basics</a:t>
             </a:r>
           </a:p>
         </p:txBody>
@@ -22598,125 +22891,30 @@
           </a:p>
         </p:txBody>
       </p:sp>
-      <p:grpSp>
-        <p:nvGrpSpPr>
-          <p:cNvPr id="5" name="Group 4"/>
-          <p:cNvGrpSpPr/>
+      <p:pic>
+        <p:nvPicPr>
+          <p:cNvPr id="4" name="Picture 3"/>
+          <p:cNvPicPr>
+            <a:picLocks noChangeAspect="1"/>
+          </p:cNvPicPr>
           <p:nvPr/>
-        </p:nvGrpSpPr>
-        <p:grpSpPr>
+        </p:nvPicPr>
+        <p:blipFill>
+          <a:blip r:embed="rId2"/>
+          <a:stretch>
+            <a:fillRect/>
+          </a:stretch>
+        </p:blipFill>
+        <p:spPr>
           <a:xfrm>
-            <a:off x="2130296" y="3765658"/>
-            <a:ext cx="7931408" cy="2450987"/>
-            <a:chOff x="1619075" y="3932120"/>
-            <a:chExt cx="7776596" cy="2403147"/>
+            <a:off x="2140209" y="3724250"/>
+            <a:ext cx="7911583" cy="2439484"/>
           </a:xfrm>
-        </p:grpSpPr>
-        <p:pic>
-          <p:nvPicPr>
-            <p:cNvPr id="6" name="Picture 5"/>
-            <p:cNvPicPr>
-              <a:picLocks noChangeAspect="1"/>
-            </p:cNvPicPr>
-            <p:nvPr/>
-          </p:nvPicPr>
-          <p:blipFill rotWithShape="1">
-            <a:blip r:embed="rId2"/>
-            <a:srcRect l="570" r="639"/>
-            <a:stretch/>
-          </p:blipFill>
-          <p:spPr>
-            <a:xfrm>
-              <a:off x="1619075" y="3932120"/>
-              <a:ext cx="7776596" cy="2403147"/>
-            </a:xfrm>
-            <a:prstGeom prst="rect">
-              <a:avLst/>
-            </a:prstGeom>
-            <a:ln>
-              <a:noFill/>
-            </a:ln>
-            <a:effectLst>
-              <a:outerShdw blurRad="292100" dist="139700" dir="2700000" algn="tl" rotWithShape="0">
-                <a:srgbClr val="333333">
-                  <a:alpha val="65000"/>
-                </a:srgbClr>
-              </a:outerShdw>
-            </a:effectLst>
-          </p:spPr>
-        </p:pic>
-        <p:sp>
-          <p:nvSpPr>
-            <p:cNvPr id="7" name="Rectangle 6"/>
-            <p:cNvSpPr/>
-            <p:nvPr/>
-          </p:nvSpPr>
-          <p:spPr bwMode="auto">
-            <a:xfrm>
-              <a:off x="8338657" y="3932120"/>
-              <a:ext cx="939567" cy="472100"/>
-            </a:xfrm>
-            <a:prstGeom prst="rect">
-              <a:avLst/>
-            </a:prstGeom>
-            <a:solidFill>
-              <a:srgbClr val="EEEEEE"/>
-            </a:solidFill>
-            <a:ln>
-              <a:noFill/>
-              <a:headEnd type="none" w="med" len="med"/>
-              <a:tailEnd type="none" w="med" len="med"/>
-            </a:ln>
-          </p:spPr>
-          <p:style>
-            <a:lnRef idx="2">
-              <a:schemeClr val="accent1">
-                <a:shade val="50000"/>
-              </a:schemeClr>
-            </a:lnRef>
-            <a:fillRef idx="1">
-              <a:schemeClr val="accent1"/>
-            </a:fillRef>
-            <a:effectRef idx="0">
-              <a:schemeClr val="accent1"/>
-            </a:effectRef>
-            <a:fontRef idx="minor">
-              <a:schemeClr val="lt1"/>
-            </a:fontRef>
-          </p:style>
-          <p:txBody>
-            <a:bodyPr vert="horz" wrap="square" lIns="0" tIns="47565" rIns="0" bIns="47565" numCol="1" rtlCol="0" anchor="ctr" anchorCtr="0" compatLnSpc="1">
-              <a:prstTxWarp prst="textNoShape">
-                <a:avLst/>
-              </a:prstTxWarp>
-            </a:bodyPr>
-            <a:lstStyle/>
-            <a:p>
-              <a:pPr algn="ctr" defTabSz="951028" fontAlgn="base">
-                <a:spcBef>
-                  <a:spcPct val="0"/>
-                </a:spcBef>
-                <a:spcAft>
-                  <a:spcPct val="0"/>
-                </a:spcAft>
-              </a:pPr>
-              <a:endParaRPr lang="en-US" sz="2040" dirty="0">
-                <a:gradFill>
-                  <a:gsLst>
-                    <a:gs pos="5439">
-                      <a:srgbClr val="F8F8F8"/>
-                    </a:gs>
-                    <a:gs pos="10000">
-                      <a:srgbClr val="F8F8F8"/>
-                    </a:gs>
-                  </a:gsLst>
-                  <a:lin ang="5400000" scaled="0"/>
-                </a:gradFill>
-              </a:endParaRPr>
-            </a:p>
-          </p:txBody>
-        </p:sp>
-      </p:grpSp>
+          <a:prstGeom prst="rect">
+            <a:avLst/>
+          </a:prstGeom>
+        </p:spPr>
+      </p:pic>
     </p:spTree>
     <p:extLst>
       <p:ext uri="{BB962C8B-B14F-4D97-AF65-F5344CB8AC3E}">
@@ -22911,6 +23109,3414 @@
 </file>
 
 <file path=ppt/slides/slide7.xml><?xml version="1.0" encoding="utf-8"?>
+<p:sld xmlns:a="http://schemas.openxmlformats.org/drawingml/2006/main" xmlns:r="http://schemas.openxmlformats.org/officeDocument/2006/relationships" xmlns:p="http://schemas.openxmlformats.org/presentationml/2006/main">
+  <p:cSld>
+    <p:spTree>
+      <p:nvGrpSpPr>
+        <p:cNvPr id="1" name=""/>
+        <p:cNvGrpSpPr/>
+        <p:nvPr/>
+      </p:nvGrpSpPr>
+      <p:grpSpPr>
+        <a:xfrm>
+          <a:off x="0" y="0"/>
+          <a:ext cx="0" cy="0"/>
+          <a:chOff x="0" y="0"/>
+          <a:chExt cx="0" cy="0"/>
+        </a:xfrm>
+      </p:grpSpPr>
+      <p:sp>
+        <p:nvSpPr>
+          <p:cNvPr id="14" name="Title 1"/>
+          <p:cNvSpPr>
+            <a:spLocks noGrp="1"/>
+          </p:cNvSpPr>
+          <p:nvPr>
+            <p:ph type="title"/>
+          </p:nvPr>
+        </p:nvSpPr>
+        <p:spPr>
+          <a:xfrm>
+            <a:off x="0" y="0"/>
+            <a:ext cx="12192000" cy="1325563"/>
+          </a:xfrm>
+          <a:solidFill>
+            <a:srgbClr val="0070C0"/>
+          </a:solidFill>
+        </p:spPr>
+        <p:txBody>
+          <a:bodyPr/>
+          <a:lstStyle/>
+          <a:p>
+            <a:r>
+              <a:rPr lang="en-US" b="1" dirty="0">
+                <a:solidFill>
+                  <a:schemeClr val="bg1"/>
+                </a:solidFill>
+              </a:rPr>
+              <a:t>Triggers</a:t>
+            </a:r>
+            <a:endParaRPr lang="en-CA" b="1" dirty="0">
+              <a:solidFill>
+                <a:schemeClr val="bg1"/>
+              </a:solidFill>
+            </a:endParaRPr>
+          </a:p>
+        </p:txBody>
+      </p:sp>
+      <p:graphicFrame>
+        <p:nvGraphicFramePr>
+          <p:cNvPr id="2" name="Table 1"/>
+          <p:cNvGraphicFramePr>
+            <a:graphicFrameLocks noGrp="1"/>
+          </p:cNvGraphicFramePr>
+          <p:nvPr>
+            <p:extLst>
+              <p:ext uri="{D42A27DB-BD31-4B8C-83A1-F6EECF244321}">
+                <p14:modId xmlns:p14="http://schemas.microsoft.com/office/powerpoint/2010/main" val="291193077"/>
+              </p:ext>
+            </p:extLst>
+          </p:nvPr>
+        </p:nvGraphicFramePr>
+        <p:xfrm>
+          <a:off x="748747" y="1630131"/>
+          <a:ext cx="10694504" cy="4059903"/>
+        </p:xfrm>
+        <a:graphic>
+          <a:graphicData uri="http://schemas.openxmlformats.org/drawingml/2006/table">
+            <a:tbl>
+              <a:tblPr/>
+              <a:tblGrid>
+                <a:gridCol w="2715370">
+                  <a:extLst>
+                    <a:ext uri="{9D8B030D-6E8A-4147-A177-3AD203B41FA5}">
+                      <a16:colId xmlns:a16="http://schemas.microsoft.com/office/drawing/2014/main" val="2801653786"/>
+                    </a:ext>
+                  </a:extLst>
+                </a:gridCol>
+                <a:gridCol w="2456953">
+                  <a:extLst>
+                    <a:ext uri="{9D8B030D-6E8A-4147-A177-3AD203B41FA5}">
+                      <a16:colId xmlns:a16="http://schemas.microsoft.com/office/drawing/2014/main" val="2366232457"/>
+                    </a:ext>
+                  </a:extLst>
+                </a:gridCol>
+                <a:gridCol w="1840727">
+                  <a:extLst>
+                    <a:ext uri="{9D8B030D-6E8A-4147-A177-3AD203B41FA5}">
+                      <a16:colId xmlns:a16="http://schemas.microsoft.com/office/drawing/2014/main" val="2473155121"/>
+                    </a:ext>
+                  </a:extLst>
+                </a:gridCol>
+                <a:gridCol w="1840727">
+                  <a:extLst>
+                    <a:ext uri="{9D8B030D-6E8A-4147-A177-3AD203B41FA5}">
+                      <a16:colId xmlns:a16="http://schemas.microsoft.com/office/drawing/2014/main" val="3111196963"/>
+                    </a:ext>
+                  </a:extLst>
+                </a:gridCol>
+                <a:gridCol w="1840727">
+                  <a:extLst>
+                    <a:ext uri="{9D8B030D-6E8A-4147-A177-3AD203B41FA5}">
+                      <a16:colId xmlns:a16="http://schemas.microsoft.com/office/drawing/2014/main" val="3637077037"/>
+                    </a:ext>
+                  </a:extLst>
+                </a:gridCol>
+              </a:tblGrid>
+              <a:tr h="265661">
+                <a:tc>
+                  <a:txBody>
+                    <a:bodyPr/>
+                    <a:lstStyle/>
+                    <a:p>
+                      <a:pPr algn="l" fontAlgn="b"/>
+                      <a:r>
+                        <a:rPr lang="en-CA" sz="1800" b="1" dirty="0">
+                          <a:effectLst/>
+                          <a:latin typeface="+mn-lt"/>
+                        </a:rPr>
+                        <a:t>Type</a:t>
+                      </a:r>
+                    </a:p>
+                  </a:txBody>
+                  <a:tcPr marL="30536" marR="30536" marT="22902" marB="22902" anchor="b">
+                    <a:lnL w="12700" cap="flat" cmpd="sng" algn="ctr">
+                      <a:solidFill>
+                        <a:srgbClr val="E3E3E3"/>
+                      </a:solidFill>
+                      <a:prstDash val="solid"/>
+                      <a:round/>
+                      <a:headEnd type="none" w="med" len="med"/>
+                      <a:tailEnd type="none" w="med" len="med"/>
+                    </a:lnL>
+                    <a:lnR w="12700" cap="flat" cmpd="sng" algn="ctr">
+                      <a:solidFill>
+                        <a:srgbClr val="E3E3E3"/>
+                      </a:solidFill>
+                      <a:prstDash val="solid"/>
+                      <a:round/>
+                      <a:headEnd type="none" w="med" len="med"/>
+                      <a:tailEnd type="none" w="med" len="med"/>
+                    </a:lnR>
+                    <a:lnT w="12700" cap="flat" cmpd="sng" algn="ctr">
+                      <a:solidFill>
+                        <a:srgbClr val="E3E3E3"/>
+                      </a:solidFill>
+                      <a:prstDash val="solid"/>
+                      <a:round/>
+                      <a:headEnd type="none" w="med" len="med"/>
+                      <a:tailEnd type="none" w="med" len="med"/>
+                    </a:lnT>
+                    <a:lnB w="4763" cap="flat" cmpd="sng" algn="ctr">
+                      <a:solidFill>
+                        <a:srgbClr val="E3E3E3"/>
+                      </a:solidFill>
+                      <a:prstDash val="solid"/>
+                      <a:round/>
+                      <a:headEnd type="none" w="med" len="med"/>
+                      <a:tailEnd type="none" w="med" len="med"/>
+                    </a:lnB>
+                    <a:solidFill>
+                      <a:schemeClr val="bg1">
+                        <a:lumMod val="85000"/>
+                      </a:schemeClr>
+                    </a:solidFill>
+                  </a:tcPr>
+                </a:tc>
+                <a:tc>
+                  <a:txBody>
+                    <a:bodyPr/>
+                    <a:lstStyle/>
+                    <a:p>
+                      <a:pPr algn="l" fontAlgn="b"/>
+                      <a:r>
+                        <a:rPr lang="en-CA" sz="1800" b="1" dirty="0">
+                          <a:effectLst/>
+                          <a:latin typeface="+mn-lt"/>
+                        </a:rPr>
+                        <a:t>Service</a:t>
+                      </a:r>
+                    </a:p>
+                  </a:txBody>
+                  <a:tcPr marL="30536" marR="30536" marT="22902" marB="22902" anchor="b">
+                    <a:lnL w="12700" cap="flat" cmpd="sng" algn="ctr">
+                      <a:solidFill>
+                        <a:srgbClr val="E3E3E3"/>
+                      </a:solidFill>
+                      <a:prstDash val="solid"/>
+                      <a:round/>
+                      <a:headEnd type="none" w="med" len="med"/>
+                      <a:tailEnd type="none" w="med" len="med"/>
+                    </a:lnL>
+                    <a:lnR w="12700" cap="flat" cmpd="sng" algn="ctr">
+                      <a:solidFill>
+                        <a:srgbClr val="E3E3E3"/>
+                      </a:solidFill>
+                      <a:prstDash val="solid"/>
+                      <a:round/>
+                      <a:headEnd type="none" w="med" len="med"/>
+                      <a:tailEnd type="none" w="med" len="med"/>
+                    </a:lnR>
+                    <a:lnT w="12700" cap="flat" cmpd="sng" algn="ctr">
+                      <a:solidFill>
+                        <a:srgbClr val="E3E3E3"/>
+                      </a:solidFill>
+                      <a:prstDash val="solid"/>
+                      <a:round/>
+                      <a:headEnd type="none" w="med" len="med"/>
+                      <a:tailEnd type="none" w="med" len="med"/>
+                    </a:lnT>
+                    <a:lnB w="4763" cap="flat" cmpd="sng" algn="ctr">
+                      <a:solidFill>
+                        <a:srgbClr val="E3E3E3"/>
+                      </a:solidFill>
+                      <a:prstDash val="solid"/>
+                      <a:round/>
+                      <a:headEnd type="none" w="med" len="med"/>
+                      <a:tailEnd type="none" w="med" len="med"/>
+                    </a:lnB>
+                    <a:solidFill>
+                      <a:schemeClr val="bg1">
+                        <a:lumMod val="85000"/>
+                      </a:schemeClr>
+                    </a:solidFill>
+                  </a:tcPr>
+                </a:tc>
+                <a:tc>
+                  <a:txBody>
+                    <a:bodyPr/>
+                    <a:lstStyle/>
+                    <a:p>
+                      <a:pPr algn="l" fontAlgn="b"/>
+                      <a:r>
+                        <a:rPr lang="en-CA" sz="1800" b="1" dirty="0">
+                          <a:effectLst/>
+                          <a:latin typeface="+mn-lt"/>
+                        </a:rPr>
+                        <a:t>Trigger</a:t>
+                      </a:r>
+                    </a:p>
+                  </a:txBody>
+                  <a:tcPr marL="30536" marR="30536" marT="22902" marB="22902" anchor="b">
+                    <a:lnL w="12700" cap="flat" cmpd="sng" algn="ctr">
+                      <a:solidFill>
+                        <a:srgbClr val="E3E3E3"/>
+                      </a:solidFill>
+                      <a:prstDash val="solid"/>
+                      <a:round/>
+                      <a:headEnd type="none" w="med" len="med"/>
+                      <a:tailEnd type="none" w="med" len="med"/>
+                    </a:lnL>
+                    <a:lnR w="12700" cap="flat" cmpd="sng" algn="ctr">
+                      <a:solidFill>
+                        <a:srgbClr val="E3E3E3"/>
+                      </a:solidFill>
+                      <a:prstDash val="solid"/>
+                      <a:round/>
+                      <a:headEnd type="none" w="med" len="med"/>
+                      <a:tailEnd type="none" w="med" len="med"/>
+                    </a:lnR>
+                    <a:lnT w="12700" cap="flat" cmpd="sng" algn="ctr">
+                      <a:solidFill>
+                        <a:srgbClr val="E3E3E3"/>
+                      </a:solidFill>
+                      <a:prstDash val="solid"/>
+                      <a:round/>
+                      <a:headEnd type="none" w="med" len="med"/>
+                      <a:tailEnd type="none" w="med" len="med"/>
+                    </a:lnT>
+                    <a:lnB w="4763" cap="flat" cmpd="sng" algn="ctr">
+                      <a:solidFill>
+                        <a:srgbClr val="E3E3E3"/>
+                      </a:solidFill>
+                      <a:prstDash val="solid"/>
+                      <a:round/>
+                      <a:headEnd type="none" w="med" len="med"/>
+                      <a:tailEnd type="none" w="med" len="med"/>
+                    </a:lnB>
+                    <a:solidFill>
+                      <a:schemeClr val="bg1">
+                        <a:lumMod val="85000"/>
+                      </a:schemeClr>
+                    </a:solidFill>
+                  </a:tcPr>
+                </a:tc>
+                <a:tc>
+                  <a:txBody>
+                    <a:bodyPr/>
+                    <a:lstStyle/>
+                    <a:p>
+                      <a:pPr algn="l" fontAlgn="b"/>
+                      <a:r>
+                        <a:rPr lang="en-CA" sz="1800" b="1" dirty="0">
+                          <a:effectLst/>
+                          <a:latin typeface="+mn-lt"/>
+                        </a:rPr>
+                        <a:t>Input</a:t>
+                      </a:r>
+                    </a:p>
+                  </a:txBody>
+                  <a:tcPr marL="30536" marR="30536" marT="22902" marB="22902" anchor="b">
+                    <a:lnL w="12700" cap="flat" cmpd="sng" algn="ctr">
+                      <a:solidFill>
+                        <a:srgbClr val="E3E3E3"/>
+                      </a:solidFill>
+                      <a:prstDash val="solid"/>
+                      <a:round/>
+                      <a:headEnd type="none" w="med" len="med"/>
+                      <a:tailEnd type="none" w="med" len="med"/>
+                    </a:lnL>
+                    <a:lnR w="12700" cap="flat" cmpd="sng" algn="ctr">
+                      <a:solidFill>
+                        <a:srgbClr val="E3E3E3"/>
+                      </a:solidFill>
+                      <a:prstDash val="solid"/>
+                      <a:round/>
+                      <a:headEnd type="none" w="med" len="med"/>
+                      <a:tailEnd type="none" w="med" len="med"/>
+                    </a:lnR>
+                    <a:lnT w="12700" cap="flat" cmpd="sng" algn="ctr">
+                      <a:solidFill>
+                        <a:srgbClr val="E3E3E3"/>
+                      </a:solidFill>
+                      <a:prstDash val="solid"/>
+                      <a:round/>
+                      <a:headEnd type="none" w="med" len="med"/>
+                      <a:tailEnd type="none" w="med" len="med"/>
+                    </a:lnT>
+                    <a:lnB w="4763" cap="flat" cmpd="sng" algn="ctr">
+                      <a:solidFill>
+                        <a:srgbClr val="E3E3E3"/>
+                      </a:solidFill>
+                      <a:prstDash val="solid"/>
+                      <a:round/>
+                      <a:headEnd type="none" w="med" len="med"/>
+                      <a:tailEnd type="none" w="med" len="med"/>
+                    </a:lnB>
+                    <a:solidFill>
+                      <a:schemeClr val="bg1">
+                        <a:lumMod val="85000"/>
+                      </a:schemeClr>
+                    </a:solidFill>
+                  </a:tcPr>
+                </a:tc>
+                <a:tc>
+                  <a:txBody>
+                    <a:bodyPr/>
+                    <a:lstStyle/>
+                    <a:p>
+                      <a:pPr algn="l" fontAlgn="b"/>
+                      <a:r>
+                        <a:rPr lang="en-CA" sz="1800" b="1" dirty="0">
+                          <a:effectLst/>
+                          <a:latin typeface="+mn-lt"/>
+                        </a:rPr>
+                        <a:t>Output</a:t>
+                      </a:r>
+                    </a:p>
+                  </a:txBody>
+                  <a:tcPr marL="30536" marR="30536" marT="22902" marB="22902" anchor="b">
+                    <a:lnL w="12700" cap="flat" cmpd="sng" algn="ctr">
+                      <a:solidFill>
+                        <a:srgbClr val="E3E3E3"/>
+                      </a:solidFill>
+                      <a:prstDash val="solid"/>
+                      <a:round/>
+                      <a:headEnd type="none" w="med" len="med"/>
+                      <a:tailEnd type="none" w="med" len="med"/>
+                    </a:lnL>
+                    <a:lnR w="12700" cap="flat" cmpd="sng" algn="ctr">
+                      <a:solidFill>
+                        <a:srgbClr val="E3E3E3"/>
+                      </a:solidFill>
+                      <a:prstDash val="solid"/>
+                      <a:round/>
+                      <a:headEnd type="none" w="med" len="med"/>
+                      <a:tailEnd type="none" w="med" len="med"/>
+                    </a:lnR>
+                    <a:lnT w="12700" cap="flat" cmpd="sng" algn="ctr">
+                      <a:solidFill>
+                        <a:srgbClr val="E3E3E3"/>
+                      </a:solidFill>
+                      <a:prstDash val="solid"/>
+                      <a:round/>
+                      <a:headEnd type="none" w="med" len="med"/>
+                      <a:tailEnd type="none" w="med" len="med"/>
+                    </a:lnT>
+                    <a:lnB w="4763" cap="flat" cmpd="sng" algn="ctr">
+                      <a:solidFill>
+                        <a:srgbClr val="E3E3E3"/>
+                      </a:solidFill>
+                      <a:prstDash val="solid"/>
+                      <a:round/>
+                      <a:headEnd type="none" w="med" len="med"/>
+                      <a:tailEnd type="none" w="med" len="med"/>
+                    </a:lnB>
+                    <a:solidFill>
+                      <a:schemeClr val="bg1">
+                        <a:lumMod val="85000"/>
+                      </a:schemeClr>
+                    </a:solidFill>
+                  </a:tcPr>
+                </a:tc>
+                <a:extLst>
+                  <a:ext uri="{0D108BD9-81ED-4DB2-BD59-A6C34878D82A}">
+                    <a16:rowId xmlns:a16="http://schemas.microsoft.com/office/drawing/2014/main" val="923405512"/>
+                  </a:ext>
+                </a:extLst>
+              </a:tr>
+              <a:tr h="375589">
+                <a:tc>
+                  <a:txBody>
+                    <a:bodyPr/>
+                    <a:lstStyle/>
+                    <a:p>
+                      <a:pPr fontAlgn="t"/>
+                      <a:r>
+                        <a:rPr lang="en-CA" sz="1800">
+                          <a:effectLst/>
+                          <a:latin typeface="+mn-lt"/>
+                        </a:rPr>
+                        <a:t>Schedule</a:t>
+                      </a:r>
+                    </a:p>
+                  </a:txBody>
+                  <a:tcPr marL="30536" marR="30536" marT="22902" marB="22902">
+                    <a:lnL w="12700" cap="flat" cmpd="sng" algn="ctr">
+                      <a:solidFill>
+                        <a:srgbClr val="E3E3E3"/>
+                      </a:solidFill>
+                      <a:prstDash val="solid"/>
+                      <a:round/>
+                      <a:headEnd type="none" w="med" len="med"/>
+                      <a:tailEnd type="none" w="med" len="med"/>
+                    </a:lnL>
+                    <a:lnR w="12700" cap="flat" cmpd="sng" algn="ctr">
+                      <a:solidFill>
+                        <a:srgbClr val="E3E3E3"/>
+                      </a:solidFill>
+                      <a:prstDash val="solid"/>
+                      <a:round/>
+                      <a:headEnd type="none" w="med" len="med"/>
+                      <a:tailEnd type="none" w="med" len="med"/>
+                    </a:lnR>
+                    <a:lnT w="4763" cap="flat" cmpd="sng" algn="ctr">
+                      <a:solidFill>
+                        <a:srgbClr val="E3E3E3"/>
+                      </a:solidFill>
+                      <a:prstDash val="solid"/>
+                      <a:round/>
+                      <a:headEnd type="none" w="med" len="med"/>
+                      <a:tailEnd type="none" w="med" len="med"/>
+                    </a:lnT>
+                    <a:lnB w="4763" cap="flat" cmpd="sng" algn="ctr">
+                      <a:solidFill>
+                        <a:srgbClr val="E3E3E3"/>
+                      </a:solidFill>
+                      <a:prstDash val="solid"/>
+                      <a:round/>
+                      <a:headEnd type="none" w="med" len="med"/>
+                      <a:tailEnd type="none" w="med" len="med"/>
+                    </a:lnB>
+                    <a:solidFill>
+                      <a:srgbClr val="FFFFFF"/>
+                    </a:solidFill>
+                  </a:tcPr>
+                </a:tc>
+                <a:tc>
+                  <a:txBody>
+                    <a:bodyPr/>
+                    <a:lstStyle/>
+                    <a:p>
+                      <a:pPr fontAlgn="t"/>
+                      <a:r>
+                        <a:rPr lang="en-CA" sz="1800">
+                          <a:effectLst/>
+                          <a:latin typeface="+mn-lt"/>
+                        </a:rPr>
+                        <a:t>Azure Functions</a:t>
+                      </a:r>
+                    </a:p>
+                  </a:txBody>
+                  <a:tcPr marL="30536" marR="30536" marT="22902" marB="22902">
+                    <a:lnL w="12700" cap="flat" cmpd="sng" algn="ctr">
+                      <a:solidFill>
+                        <a:srgbClr val="E3E3E3"/>
+                      </a:solidFill>
+                      <a:prstDash val="solid"/>
+                      <a:round/>
+                      <a:headEnd type="none" w="med" len="med"/>
+                      <a:tailEnd type="none" w="med" len="med"/>
+                    </a:lnL>
+                    <a:lnR w="12700" cap="flat" cmpd="sng" algn="ctr">
+                      <a:solidFill>
+                        <a:srgbClr val="E3E3E3"/>
+                      </a:solidFill>
+                      <a:prstDash val="solid"/>
+                      <a:round/>
+                      <a:headEnd type="none" w="med" len="med"/>
+                      <a:tailEnd type="none" w="med" len="med"/>
+                    </a:lnR>
+                    <a:lnT w="4763" cap="flat" cmpd="sng" algn="ctr">
+                      <a:solidFill>
+                        <a:srgbClr val="E3E3E3"/>
+                      </a:solidFill>
+                      <a:prstDash val="solid"/>
+                      <a:round/>
+                      <a:headEnd type="none" w="med" len="med"/>
+                      <a:tailEnd type="none" w="med" len="med"/>
+                    </a:lnT>
+                    <a:lnB w="4763" cap="flat" cmpd="sng" algn="ctr">
+                      <a:solidFill>
+                        <a:srgbClr val="E3E3E3"/>
+                      </a:solidFill>
+                      <a:prstDash val="solid"/>
+                      <a:round/>
+                      <a:headEnd type="none" w="med" len="med"/>
+                      <a:tailEnd type="none" w="med" len="med"/>
+                    </a:lnB>
+                    <a:solidFill>
+                      <a:srgbClr val="FFFFFF"/>
+                    </a:solidFill>
+                  </a:tcPr>
+                </a:tc>
+                <a:tc>
+                  <a:txBody>
+                    <a:bodyPr/>
+                    <a:lstStyle/>
+                    <a:p>
+                      <a:pPr algn="ctr" fontAlgn="t"/>
+                      <a:r>
+                        <a:rPr lang="en-CA" sz="1800" dirty="0">
+                          <a:effectLst/>
+                          <a:latin typeface="+mn-lt"/>
+                        </a:rPr>
+                        <a:t>✔</a:t>
+                      </a:r>
+                    </a:p>
+                  </a:txBody>
+                  <a:tcPr marL="30536" marR="30536" marT="22902" marB="22902">
+                    <a:lnL w="12700" cap="flat" cmpd="sng" algn="ctr">
+                      <a:solidFill>
+                        <a:srgbClr val="E3E3E3"/>
+                      </a:solidFill>
+                      <a:prstDash val="solid"/>
+                      <a:round/>
+                      <a:headEnd type="none" w="med" len="med"/>
+                      <a:tailEnd type="none" w="med" len="med"/>
+                    </a:lnL>
+                    <a:lnR w="12700" cap="flat" cmpd="sng" algn="ctr">
+                      <a:solidFill>
+                        <a:srgbClr val="E3E3E3"/>
+                      </a:solidFill>
+                      <a:prstDash val="solid"/>
+                      <a:round/>
+                      <a:headEnd type="none" w="med" len="med"/>
+                      <a:tailEnd type="none" w="med" len="med"/>
+                    </a:lnR>
+                    <a:lnT w="4763" cap="flat" cmpd="sng" algn="ctr">
+                      <a:solidFill>
+                        <a:srgbClr val="E3E3E3"/>
+                      </a:solidFill>
+                      <a:prstDash val="solid"/>
+                      <a:round/>
+                      <a:headEnd type="none" w="med" len="med"/>
+                      <a:tailEnd type="none" w="med" len="med"/>
+                    </a:lnT>
+                    <a:lnB w="4763" cap="flat" cmpd="sng" algn="ctr">
+                      <a:solidFill>
+                        <a:srgbClr val="E3E3E3"/>
+                      </a:solidFill>
+                      <a:prstDash val="solid"/>
+                      <a:round/>
+                      <a:headEnd type="none" w="med" len="med"/>
+                      <a:tailEnd type="none" w="med" len="med"/>
+                    </a:lnB>
+                    <a:solidFill>
+                      <a:srgbClr val="FFFFFF"/>
+                    </a:solidFill>
+                  </a:tcPr>
+                </a:tc>
+                <a:tc>
+                  <a:txBody>
+                    <a:bodyPr/>
+                    <a:lstStyle/>
+                    <a:p>
+                      <a:pPr algn="ctr" fontAlgn="t"/>
+                      <a:endParaRPr lang="en-CA" sz="1800" dirty="0">
+                        <a:effectLst/>
+                        <a:latin typeface="+mn-lt"/>
+                      </a:endParaRPr>
+                    </a:p>
+                  </a:txBody>
+                  <a:tcPr marL="30536" marR="30536" marT="22902" marB="22902">
+                    <a:lnL w="12700" cap="flat" cmpd="sng" algn="ctr">
+                      <a:solidFill>
+                        <a:srgbClr val="E3E3E3"/>
+                      </a:solidFill>
+                      <a:prstDash val="solid"/>
+                      <a:round/>
+                      <a:headEnd type="none" w="med" len="med"/>
+                      <a:tailEnd type="none" w="med" len="med"/>
+                    </a:lnL>
+                    <a:lnR w="12700" cap="flat" cmpd="sng" algn="ctr">
+                      <a:solidFill>
+                        <a:srgbClr val="E3E3E3"/>
+                      </a:solidFill>
+                      <a:prstDash val="solid"/>
+                      <a:round/>
+                      <a:headEnd type="none" w="med" len="med"/>
+                      <a:tailEnd type="none" w="med" len="med"/>
+                    </a:lnR>
+                    <a:lnT w="4763" cap="flat" cmpd="sng" algn="ctr">
+                      <a:solidFill>
+                        <a:srgbClr val="E3E3E3"/>
+                      </a:solidFill>
+                      <a:prstDash val="solid"/>
+                      <a:round/>
+                      <a:headEnd type="none" w="med" len="med"/>
+                      <a:tailEnd type="none" w="med" len="med"/>
+                    </a:lnT>
+                    <a:lnB w="4763" cap="flat" cmpd="sng" algn="ctr">
+                      <a:solidFill>
+                        <a:srgbClr val="E3E3E3"/>
+                      </a:solidFill>
+                      <a:prstDash val="solid"/>
+                      <a:round/>
+                      <a:headEnd type="none" w="med" len="med"/>
+                      <a:tailEnd type="none" w="med" len="med"/>
+                    </a:lnB>
+                    <a:solidFill>
+                      <a:srgbClr val="FFFFFF"/>
+                    </a:solidFill>
+                  </a:tcPr>
+                </a:tc>
+                <a:tc>
+                  <a:txBody>
+                    <a:bodyPr/>
+                    <a:lstStyle/>
+                    <a:p>
+                      <a:pPr algn="ctr" fontAlgn="t"/>
+                      <a:endParaRPr lang="en-CA" sz="1800">
+                        <a:effectLst/>
+                        <a:latin typeface="+mn-lt"/>
+                      </a:endParaRPr>
+                    </a:p>
+                  </a:txBody>
+                  <a:tcPr marL="30536" marR="30536" marT="22902" marB="22902">
+                    <a:lnL w="12700" cap="flat" cmpd="sng" algn="ctr">
+                      <a:solidFill>
+                        <a:srgbClr val="E3E3E3"/>
+                      </a:solidFill>
+                      <a:prstDash val="solid"/>
+                      <a:round/>
+                      <a:headEnd type="none" w="med" len="med"/>
+                      <a:tailEnd type="none" w="med" len="med"/>
+                    </a:lnL>
+                    <a:lnR w="12700" cap="flat" cmpd="sng" algn="ctr">
+                      <a:solidFill>
+                        <a:srgbClr val="E3E3E3"/>
+                      </a:solidFill>
+                      <a:prstDash val="solid"/>
+                      <a:round/>
+                      <a:headEnd type="none" w="med" len="med"/>
+                      <a:tailEnd type="none" w="med" len="med"/>
+                    </a:lnR>
+                    <a:lnT w="4763" cap="flat" cmpd="sng" algn="ctr">
+                      <a:solidFill>
+                        <a:srgbClr val="E3E3E3"/>
+                      </a:solidFill>
+                      <a:prstDash val="solid"/>
+                      <a:round/>
+                      <a:headEnd type="none" w="med" len="med"/>
+                      <a:tailEnd type="none" w="med" len="med"/>
+                    </a:lnT>
+                    <a:lnB w="4763" cap="flat" cmpd="sng" algn="ctr">
+                      <a:solidFill>
+                        <a:srgbClr val="E3E3E3"/>
+                      </a:solidFill>
+                      <a:prstDash val="solid"/>
+                      <a:round/>
+                      <a:headEnd type="none" w="med" len="med"/>
+                      <a:tailEnd type="none" w="med" len="med"/>
+                    </a:lnB>
+                    <a:solidFill>
+                      <a:srgbClr val="FFFFFF"/>
+                    </a:solidFill>
+                  </a:tcPr>
+                </a:tc>
+                <a:extLst>
+                  <a:ext uri="{0D108BD9-81ED-4DB2-BD59-A6C34878D82A}">
+                    <a16:rowId xmlns:a16="http://schemas.microsoft.com/office/drawing/2014/main" val="326631681"/>
+                  </a:ext>
+                </a:extLst>
+              </a:tr>
+              <a:tr h="298086">
+                <a:tc>
+                  <a:txBody>
+                    <a:bodyPr/>
+                    <a:lstStyle/>
+                    <a:p>
+                      <a:pPr fontAlgn="t"/>
+                      <a:r>
+                        <a:rPr lang="en-CA" sz="1800">
+                          <a:effectLst/>
+                          <a:latin typeface="+mn-lt"/>
+                        </a:rPr>
+                        <a:t>HTTP (REST or webhook)</a:t>
+                      </a:r>
+                    </a:p>
+                  </a:txBody>
+                  <a:tcPr marL="30536" marR="30536" marT="22902" marB="22902">
+                    <a:lnL w="12700" cap="flat" cmpd="sng" algn="ctr">
+                      <a:solidFill>
+                        <a:srgbClr val="E3E3E3"/>
+                      </a:solidFill>
+                      <a:prstDash val="solid"/>
+                      <a:round/>
+                      <a:headEnd type="none" w="med" len="med"/>
+                      <a:tailEnd type="none" w="med" len="med"/>
+                    </a:lnL>
+                    <a:lnR w="12700" cap="flat" cmpd="sng" algn="ctr">
+                      <a:solidFill>
+                        <a:srgbClr val="E3E3E3"/>
+                      </a:solidFill>
+                      <a:prstDash val="solid"/>
+                      <a:round/>
+                      <a:headEnd type="none" w="med" len="med"/>
+                      <a:tailEnd type="none" w="med" len="med"/>
+                    </a:lnR>
+                    <a:lnT w="4763" cap="flat" cmpd="sng" algn="ctr">
+                      <a:solidFill>
+                        <a:srgbClr val="E3E3E3"/>
+                      </a:solidFill>
+                      <a:prstDash val="solid"/>
+                      <a:round/>
+                      <a:headEnd type="none" w="med" len="med"/>
+                      <a:tailEnd type="none" w="med" len="med"/>
+                    </a:lnT>
+                    <a:lnB w="4763" cap="flat" cmpd="sng" algn="ctr">
+                      <a:solidFill>
+                        <a:srgbClr val="E3E3E3"/>
+                      </a:solidFill>
+                      <a:prstDash val="solid"/>
+                      <a:round/>
+                      <a:headEnd type="none" w="med" len="med"/>
+                      <a:tailEnd type="none" w="med" len="med"/>
+                    </a:lnB>
+                    <a:solidFill>
+                      <a:srgbClr val="FFFFFF"/>
+                    </a:solidFill>
+                  </a:tcPr>
+                </a:tc>
+                <a:tc>
+                  <a:txBody>
+                    <a:bodyPr/>
+                    <a:lstStyle/>
+                    <a:p>
+                      <a:pPr fontAlgn="t"/>
+                      <a:r>
+                        <a:rPr lang="en-CA" sz="1800" dirty="0">
+                          <a:effectLst/>
+                          <a:latin typeface="+mn-lt"/>
+                        </a:rPr>
+                        <a:t>Azure Functions</a:t>
+                      </a:r>
+                    </a:p>
+                  </a:txBody>
+                  <a:tcPr marL="30536" marR="30536" marT="22902" marB="22902">
+                    <a:lnL w="12700" cap="flat" cmpd="sng" algn="ctr">
+                      <a:solidFill>
+                        <a:srgbClr val="E3E3E3"/>
+                      </a:solidFill>
+                      <a:prstDash val="solid"/>
+                      <a:round/>
+                      <a:headEnd type="none" w="med" len="med"/>
+                      <a:tailEnd type="none" w="med" len="med"/>
+                    </a:lnL>
+                    <a:lnR w="12700" cap="flat" cmpd="sng" algn="ctr">
+                      <a:solidFill>
+                        <a:srgbClr val="E3E3E3"/>
+                      </a:solidFill>
+                      <a:prstDash val="solid"/>
+                      <a:round/>
+                      <a:headEnd type="none" w="med" len="med"/>
+                      <a:tailEnd type="none" w="med" len="med"/>
+                    </a:lnR>
+                    <a:lnT w="4763" cap="flat" cmpd="sng" algn="ctr">
+                      <a:solidFill>
+                        <a:srgbClr val="E3E3E3"/>
+                      </a:solidFill>
+                      <a:prstDash val="solid"/>
+                      <a:round/>
+                      <a:headEnd type="none" w="med" len="med"/>
+                      <a:tailEnd type="none" w="med" len="med"/>
+                    </a:lnT>
+                    <a:lnB w="4763" cap="flat" cmpd="sng" algn="ctr">
+                      <a:solidFill>
+                        <a:srgbClr val="E3E3E3"/>
+                      </a:solidFill>
+                      <a:prstDash val="solid"/>
+                      <a:round/>
+                      <a:headEnd type="none" w="med" len="med"/>
+                      <a:tailEnd type="none" w="med" len="med"/>
+                    </a:lnB>
+                    <a:solidFill>
+                      <a:srgbClr val="FFFFFF"/>
+                    </a:solidFill>
+                  </a:tcPr>
+                </a:tc>
+                <a:tc>
+                  <a:txBody>
+                    <a:bodyPr/>
+                    <a:lstStyle/>
+                    <a:p>
+                      <a:pPr algn="ctr" fontAlgn="t"/>
+                      <a:r>
+                        <a:rPr lang="en-CA" sz="1800" dirty="0">
+                          <a:effectLst/>
+                          <a:latin typeface="+mn-lt"/>
+                        </a:rPr>
+                        <a:t>✔</a:t>
+                      </a:r>
+                    </a:p>
+                  </a:txBody>
+                  <a:tcPr marL="30536" marR="30536" marT="22902" marB="22902">
+                    <a:lnL w="12700" cap="flat" cmpd="sng" algn="ctr">
+                      <a:solidFill>
+                        <a:srgbClr val="E3E3E3"/>
+                      </a:solidFill>
+                      <a:prstDash val="solid"/>
+                      <a:round/>
+                      <a:headEnd type="none" w="med" len="med"/>
+                      <a:tailEnd type="none" w="med" len="med"/>
+                    </a:lnL>
+                    <a:lnR w="12700" cap="flat" cmpd="sng" algn="ctr">
+                      <a:solidFill>
+                        <a:srgbClr val="E3E3E3"/>
+                      </a:solidFill>
+                      <a:prstDash val="solid"/>
+                      <a:round/>
+                      <a:headEnd type="none" w="med" len="med"/>
+                      <a:tailEnd type="none" w="med" len="med"/>
+                    </a:lnR>
+                    <a:lnT w="4763" cap="flat" cmpd="sng" algn="ctr">
+                      <a:solidFill>
+                        <a:srgbClr val="E3E3E3"/>
+                      </a:solidFill>
+                      <a:prstDash val="solid"/>
+                      <a:round/>
+                      <a:headEnd type="none" w="med" len="med"/>
+                      <a:tailEnd type="none" w="med" len="med"/>
+                    </a:lnT>
+                    <a:lnB w="4763" cap="flat" cmpd="sng" algn="ctr">
+                      <a:solidFill>
+                        <a:srgbClr val="E3E3E3"/>
+                      </a:solidFill>
+                      <a:prstDash val="solid"/>
+                      <a:round/>
+                      <a:headEnd type="none" w="med" len="med"/>
+                      <a:tailEnd type="none" w="med" len="med"/>
+                    </a:lnB>
+                    <a:solidFill>
+                      <a:srgbClr val="FFFFFF"/>
+                    </a:solidFill>
+                  </a:tcPr>
+                </a:tc>
+                <a:tc>
+                  <a:txBody>
+                    <a:bodyPr/>
+                    <a:lstStyle/>
+                    <a:p>
+                      <a:pPr algn="ctr" fontAlgn="t"/>
+                      <a:endParaRPr lang="en-CA" sz="1800">
+                        <a:effectLst/>
+                        <a:latin typeface="+mn-lt"/>
+                      </a:endParaRPr>
+                    </a:p>
+                  </a:txBody>
+                  <a:tcPr marL="30536" marR="30536" marT="22902" marB="22902">
+                    <a:lnL w="12700" cap="flat" cmpd="sng" algn="ctr">
+                      <a:solidFill>
+                        <a:srgbClr val="E3E3E3"/>
+                      </a:solidFill>
+                      <a:prstDash val="solid"/>
+                      <a:round/>
+                      <a:headEnd type="none" w="med" len="med"/>
+                      <a:tailEnd type="none" w="med" len="med"/>
+                    </a:lnL>
+                    <a:lnR w="12700" cap="flat" cmpd="sng" algn="ctr">
+                      <a:solidFill>
+                        <a:srgbClr val="E3E3E3"/>
+                      </a:solidFill>
+                      <a:prstDash val="solid"/>
+                      <a:round/>
+                      <a:headEnd type="none" w="med" len="med"/>
+                      <a:tailEnd type="none" w="med" len="med"/>
+                    </a:lnR>
+                    <a:lnT w="4763" cap="flat" cmpd="sng" algn="ctr">
+                      <a:solidFill>
+                        <a:srgbClr val="E3E3E3"/>
+                      </a:solidFill>
+                      <a:prstDash val="solid"/>
+                      <a:round/>
+                      <a:headEnd type="none" w="med" len="med"/>
+                      <a:tailEnd type="none" w="med" len="med"/>
+                    </a:lnT>
+                    <a:lnB w="4763" cap="flat" cmpd="sng" algn="ctr">
+                      <a:solidFill>
+                        <a:srgbClr val="E3E3E3"/>
+                      </a:solidFill>
+                      <a:prstDash val="solid"/>
+                      <a:round/>
+                      <a:headEnd type="none" w="med" len="med"/>
+                      <a:tailEnd type="none" w="med" len="med"/>
+                    </a:lnB>
+                    <a:solidFill>
+                      <a:srgbClr val="FFFFFF"/>
+                    </a:solidFill>
+                  </a:tcPr>
+                </a:tc>
+                <a:tc>
+                  <a:txBody>
+                    <a:bodyPr/>
+                    <a:lstStyle/>
+                    <a:p>
+                      <a:pPr algn="ctr" fontAlgn="t"/>
+                      <a:r>
+                        <a:rPr lang="en-CA" sz="1800">
+                          <a:effectLst/>
+                          <a:latin typeface="+mn-lt"/>
+                        </a:rPr>
+                        <a:t>✔*</a:t>
+                      </a:r>
+                    </a:p>
+                  </a:txBody>
+                  <a:tcPr marL="30536" marR="30536" marT="22902" marB="22902">
+                    <a:lnL w="12700" cap="flat" cmpd="sng" algn="ctr">
+                      <a:solidFill>
+                        <a:srgbClr val="E3E3E3"/>
+                      </a:solidFill>
+                      <a:prstDash val="solid"/>
+                      <a:round/>
+                      <a:headEnd type="none" w="med" len="med"/>
+                      <a:tailEnd type="none" w="med" len="med"/>
+                    </a:lnL>
+                    <a:lnR w="12700" cap="flat" cmpd="sng" algn="ctr">
+                      <a:solidFill>
+                        <a:srgbClr val="E3E3E3"/>
+                      </a:solidFill>
+                      <a:prstDash val="solid"/>
+                      <a:round/>
+                      <a:headEnd type="none" w="med" len="med"/>
+                      <a:tailEnd type="none" w="med" len="med"/>
+                    </a:lnR>
+                    <a:lnT w="4763" cap="flat" cmpd="sng" algn="ctr">
+                      <a:solidFill>
+                        <a:srgbClr val="E3E3E3"/>
+                      </a:solidFill>
+                      <a:prstDash val="solid"/>
+                      <a:round/>
+                      <a:headEnd type="none" w="med" len="med"/>
+                      <a:tailEnd type="none" w="med" len="med"/>
+                    </a:lnT>
+                    <a:lnB w="4763" cap="flat" cmpd="sng" algn="ctr">
+                      <a:solidFill>
+                        <a:srgbClr val="E3E3E3"/>
+                      </a:solidFill>
+                      <a:prstDash val="solid"/>
+                      <a:round/>
+                      <a:headEnd type="none" w="med" len="med"/>
+                      <a:tailEnd type="none" w="med" len="med"/>
+                    </a:lnB>
+                    <a:solidFill>
+                      <a:srgbClr val="FFFFFF"/>
+                    </a:solidFill>
+                  </a:tcPr>
+                </a:tc>
+                <a:extLst>
+                  <a:ext uri="{0D108BD9-81ED-4DB2-BD59-A6C34878D82A}">
+                    <a16:rowId xmlns:a16="http://schemas.microsoft.com/office/drawing/2014/main" val="790830816"/>
+                  </a:ext>
+                </a:extLst>
+              </a:tr>
+              <a:tr h="375589">
+                <a:tc>
+                  <a:txBody>
+                    <a:bodyPr/>
+                    <a:lstStyle/>
+                    <a:p>
+                      <a:pPr fontAlgn="t"/>
+                      <a:r>
+                        <a:rPr lang="en-CA" sz="1800">
+                          <a:effectLst/>
+                          <a:latin typeface="+mn-lt"/>
+                        </a:rPr>
+                        <a:t>Blob Storage</a:t>
+                      </a:r>
+                    </a:p>
+                  </a:txBody>
+                  <a:tcPr marL="30536" marR="30536" marT="22902" marB="22902">
+                    <a:lnL w="12700" cap="flat" cmpd="sng" algn="ctr">
+                      <a:solidFill>
+                        <a:srgbClr val="E3E3E3"/>
+                      </a:solidFill>
+                      <a:prstDash val="solid"/>
+                      <a:round/>
+                      <a:headEnd type="none" w="med" len="med"/>
+                      <a:tailEnd type="none" w="med" len="med"/>
+                    </a:lnL>
+                    <a:lnR w="12700" cap="flat" cmpd="sng" algn="ctr">
+                      <a:solidFill>
+                        <a:srgbClr val="E3E3E3"/>
+                      </a:solidFill>
+                      <a:prstDash val="solid"/>
+                      <a:round/>
+                      <a:headEnd type="none" w="med" len="med"/>
+                      <a:tailEnd type="none" w="med" len="med"/>
+                    </a:lnR>
+                    <a:lnT w="4763" cap="flat" cmpd="sng" algn="ctr">
+                      <a:solidFill>
+                        <a:srgbClr val="E3E3E3"/>
+                      </a:solidFill>
+                      <a:prstDash val="solid"/>
+                      <a:round/>
+                      <a:headEnd type="none" w="med" len="med"/>
+                      <a:tailEnd type="none" w="med" len="med"/>
+                    </a:lnT>
+                    <a:lnB w="4763" cap="flat" cmpd="sng" algn="ctr">
+                      <a:solidFill>
+                        <a:srgbClr val="E3E3E3"/>
+                      </a:solidFill>
+                      <a:prstDash val="solid"/>
+                      <a:round/>
+                      <a:headEnd type="none" w="med" len="med"/>
+                      <a:tailEnd type="none" w="med" len="med"/>
+                    </a:lnB>
+                    <a:solidFill>
+                      <a:srgbClr val="FFFFFF"/>
+                    </a:solidFill>
+                  </a:tcPr>
+                </a:tc>
+                <a:tc>
+                  <a:txBody>
+                    <a:bodyPr/>
+                    <a:lstStyle/>
+                    <a:p>
+                      <a:pPr fontAlgn="t"/>
+                      <a:r>
+                        <a:rPr lang="en-CA" sz="1800">
+                          <a:effectLst/>
+                          <a:latin typeface="+mn-lt"/>
+                        </a:rPr>
+                        <a:t>Azure Storage</a:t>
+                      </a:r>
+                    </a:p>
+                  </a:txBody>
+                  <a:tcPr marL="30536" marR="30536" marT="22902" marB="22902">
+                    <a:lnL w="12700" cap="flat" cmpd="sng" algn="ctr">
+                      <a:solidFill>
+                        <a:srgbClr val="E3E3E3"/>
+                      </a:solidFill>
+                      <a:prstDash val="solid"/>
+                      <a:round/>
+                      <a:headEnd type="none" w="med" len="med"/>
+                      <a:tailEnd type="none" w="med" len="med"/>
+                    </a:lnL>
+                    <a:lnR w="12700" cap="flat" cmpd="sng" algn="ctr">
+                      <a:solidFill>
+                        <a:srgbClr val="E3E3E3"/>
+                      </a:solidFill>
+                      <a:prstDash val="solid"/>
+                      <a:round/>
+                      <a:headEnd type="none" w="med" len="med"/>
+                      <a:tailEnd type="none" w="med" len="med"/>
+                    </a:lnR>
+                    <a:lnT w="4763" cap="flat" cmpd="sng" algn="ctr">
+                      <a:solidFill>
+                        <a:srgbClr val="E3E3E3"/>
+                      </a:solidFill>
+                      <a:prstDash val="solid"/>
+                      <a:round/>
+                      <a:headEnd type="none" w="med" len="med"/>
+                      <a:tailEnd type="none" w="med" len="med"/>
+                    </a:lnT>
+                    <a:lnB w="4763" cap="flat" cmpd="sng" algn="ctr">
+                      <a:solidFill>
+                        <a:srgbClr val="E3E3E3"/>
+                      </a:solidFill>
+                      <a:prstDash val="solid"/>
+                      <a:round/>
+                      <a:headEnd type="none" w="med" len="med"/>
+                      <a:tailEnd type="none" w="med" len="med"/>
+                    </a:lnB>
+                    <a:solidFill>
+                      <a:srgbClr val="FFFFFF"/>
+                    </a:solidFill>
+                  </a:tcPr>
+                </a:tc>
+                <a:tc>
+                  <a:txBody>
+                    <a:bodyPr/>
+                    <a:lstStyle/>
+                    <a:p>
+                      <a:pPr algn="ctr" fontAlgn="t"/>
+                      <a:r>
+                        <a:rPr lang="en-CA" sz="1800">
+                          <a:effectLst/>
+                          <a:latin typeface="+mn-lt"/>
+                        </a:rPr>
+                        <a:t>✔</a:t>
+                      </a:r>
+                    </a:p>
+                  </a:txBody>
+                  <a:tcPr marL="30536" marR="30536" marT="22902" marB="22902">
+                    <a:lnL w="12700" cap="flat" cmpd="sng" algn="ctr">
+                      <a:solidFill>
+                        <a:srgbClr val="E3E3E3"/>
+                      </a:solidFill>
+                      <a:prstDash val="solid"/>
+                      <a:round/>
+                      <a:headEnd type="none" w="med" len="med"/>
+                      <a:tailEnd type="none" w="med" len="med"/>
+                    </a:lnL>
+                    <a:lnR w="12700" cap="flat" cmpd="sng" algn="ctr">
+                      <a:solidFill>
+                        <a:srgbClr val="E3E3E3"/>
+                      </a:solidFill>
+                      <a:prstDash val="solid"/>
+                      <a:round/>
+                      <a:headEnd type="none" w="med" len="med"/>
+                      <a:tailEnd type="none" w="med" len="med"/>
+                    </a:lnR>
+                    <a:lnT w="4763" cap="flat" cmpd="sng" algn="ctr">
+                      <a:solidFill>
+                        <a:srgbClr val="E3E3E3"/>
+                      </a:solidFill>
+                      <a:prstDash val="solid"/>
+                      <a:round/>
+                      <a:headEnd type="none" w="med" len="med"/>
+                      <a:tailEnd type="none" w="med" len="med"/>
+                    </a:lnT>
+                    <a:lnB w="4763" cap="flat" cmpd="sng" algn="ctr">
+                      <a:solidFill>
+                        <a:srgbClr val="E3E3E3"/>
+                      </a:solidFill>
+                      <a:prstDash val="solid"/>
+                      <a:round/>
+                      <a:headEnd type="none" w="med" len="med"/>
+                      <a:tailEnd type="none" w="med" len="med"/>
+                    </a:lnB>
+                    <a:solidFill>
+                      <a:srgbClr val="FFFFFF"/>
+                    </a:solidFill>
+                  </a:tcPr>
+                </a:tc>
+                <a:tc>
+                  <a:txBody>
+                    <a:bodyPr/>
+                    <a:lstStyle/>
+                    <a:p>
+                      <a:pPr algn="ctr" fontAlgn="t"/>
+                      <a:r>
+                        <a:rPr lang="en-CA" sz="1800">
+                          <a:effectLst/>
+                          <a:latin typeface="+mn-lt"/>
+                        </a:rPr>
+                        <a:t>✔</a:t>
+                      </a:r>
+                    </a:p>
+                  </a:txBody>
+                  <a:tcPr marL="30536" marR="30536" marT="22902" marB="22902">
+                    <a:lnL w="12700" cap="flat" cmpd="sng" algn="ctr">
+                      <a:solidFill>
+                        <a:srgbClr val="E3E3E3"/>
+                      </a:solidFill>
+                      <a:prstDash val="solid"/>
+                      <a:round/>
+                      <a:headEnd type="none" w="med" len="med"/>
+                      <a:tailEnd type="none" w="med" len="med"/>
+                    </a:lnL>
+                    <a:lnR w="12700" cap="flat" cmpd="sng" algn="ctr">
+                      <a:solidFill>
+                        <a:srgbClr val="E3E3E3"/>
+                      </a:solidFill>
+                      <a:prstDash val="solid"/>
+                      <a:round/>
+                      <a:headEnd type="none" w="med" len="med"/>
+                      <a:tailEnd type="none" w="med" len="med"/>
+                    </a:lnR>
+                    <a:lnT w="4763" cap="flat" cmpd="sng" algn="ctr">
+                      <a:solidFill>
+                        <a:srgbClr val="E3E3E3"/>
+                      </a:solidFill>
+                      <a:prstDash val="solid"/>
+                      <a:round/>
+                      <a:headEnd type="none" w="med" len="med"/>
+                      <a:tailEnd type="none" w="med" len="med"/>
+                    </a:lnT>
+                    <a:lnB w="4763" cap="flat" cmpd="sng" algn="ctr">
+                      <a:solidFill>
+                        <a:srgbClr val="E3E3E3"/>
+                      </a:solidFill>
+                      <a:prstDash val="solid"/>
+                      <a:round/>
+                      <a:headEnd type="none" w="med" len="med"/>
+                      <a:tailEnd type="none" w="med" len="med"/>
+                    </a:lnB>
+                    <a:solidFill>
+                      <a:srgbClr val="FFFFFF"/>
+                    </a:solidFill>
+                  </a:tcPr>
+                </a:tc>
+                <a:tc>
+                  <a:txBody>
+                    <a:bodyPr/>
+                    <a:lstStyle/>
+                    <a:p>
+                      <a:pPr algn="ctr" fontAlgn="t"/>
+                      <a:r>
+                        <a:rPr lang="en-CA" sz="1800">
+                          <a:effectLst/>
+                          <a:latin typeface="+mn-lt"/>
+                        </a:rPr>
+                        <a:t>✔</a:t>
+                      </a:r>
+                    </a:p>
+                  </a:txBody>
+                  <a:tcPr marL="30536" marR="30536" marT="22902" marB="22902">
+                    <a:lnL w="12700" cap="flat" cmpd="sng" algn="ctr">
+                      <a:solidFill>
+                        <a:srgbClr val="E3E3E3"/>
+                      </a:solidFill>
+                      <a:prstDash val="solid"/>
+                      <a:round/>
+                      <a:headEnd type="none" w="med" len="med"/>
+                      <a:tailEnd type="none" w="med" len="med"/>
+                    </a:lnL>
+                    <a:lnR w="12700" cap="flat" cmpd="sng" algn="ctr">
+                      <a:solidFill>
+                        <a:srgbClr val="E3E3E3"/>
+                      </a:solidFill>
+                      <a:prstDash val="solid"/>
+                      <a:round/>
+                      <a:headEnd type="none" w="med" len="med"/>
+                      <a:tailEnd type="none" w="med" len="med"/>
+                    </a:lnR>
+                    <a:lnT w="4763" cap="flat" cmpd="sng" algn="ctr">
+                      <a:solidFill>
+                        <a:srgbClr val="E3E3E3"/>
+                      </a:solidFill>
+                      <a:prstDash val="solid"/>
+                      <a:round/>
+                      <a:headEnd type="none" w="med" len="med"/>
+                      <a:tailEnd type="none" w="med" len="med"/>
+                    </a:lnT>
+                    <a:lnB w="4763" cap="flat" cmpd="sng" algn="ctr">
+                      <a:solidFill>
+                        <a:srgbClr val="E3E3E3"/>
+                      </a:solidFill>
+                      <a:prstDash val="solid"/>
+                      <a:round/>
+                      <a:headEnd type="none" w="med" len="med"/>
+                      <a:tailEnd type="none" w="med" len="med"/>
+                    </a:lnB>
+                    <a:solidFill>
+                      <a:srgbClr val="FFFFFF"/>
+                    </a:solidFill>
+                  </a:tcPr>
+                </a:tc>
+                <a:extLst>
+                  <a:ext uri="{0D108BD9-81ED-4DB2-BD59-A6C34878D82A}">
+                    <a16:rowId xmlns:a16="http://schemas.microsoft.com/office/drawing/2014/main" val="2735624255"/>
+                  </a:ext>
+                </a:extLst>
+              </a:tr>
+              <a:tr h="375589">
+                <a:tc>
+                  <a:txBody>
+                    <a:bodyPr/>
+                    <a:lstStyle/>
+                    <a:p>
+                      <a:pPr fontAlgn="t"/>
+                      <a:r>
+                        <a:rPr lang="en-CA" sz="1800">
+                          <a:effectLst/>
+                          <a:latin typeface="+mn-lt"/>
+                        </a:rPr>
+                        <a:t>Events</a:t>
+                      </a:r>
+                    </a:p>
+                  </a:txBody>
+                  <a:tcPr marL="30536" marR="30536" marT="22902" marB="22902">
+                    <a:lnL w="12700" cap="flat" cmpd="sng" algn="ctr">
+                      <a:solidFill>
+                        <a:srgbClr val="E3E3E3"/>
+                      </a:solidFill>
+                      <a:prstDash val="solid"/>
+                      <a:round/>
+                      <a:headEnd type="none" w="med" len="med"/>
+                      <a:tailEnd type="none" w="med" len="med"/>
+                    </a:lnL>
+                    <a:lnR w="12700" cap="flat" cmpd="sng" algn="ctr">
+                      <a:solidFill>
+                        <a:srgbClr val="E3E3E3"/>
+                      </a:solidFill>
+                      <a:prstDash val="solid"/>
+                      <a:round/>
+                      <a:headEnd type="none" w="med" len="med"/>
+                      <a:tailEnd type="none" w="med" len="med"/>
+                    </a:lnR>
+                    <a:lnT w="4763" cap="flat" cmpd="sng" algn="ctr">
+                      <a:solidFill>
+                        <a:srgbClr val="E3E3E3"/>
+                      </a:solidFill>
+                      <a:prstDash val="solid"/>
+                      <a:round/>
+                      <a:headEnd type="none" w="med" len="med"/>
+                      <a:tailEnd type="none" w="med" len="med"/>
+                    </a:lnT>
+                    <a:lnB w="4763" cap="flat" cmpd="sng" algn="ctr">
+                      <a:solidFill>
+                        <a:srgbClr val="E3E3E3"/>
+                      </a:solidFill>
+                      <a:prstDash val="solid"/>
+                      <a:round/>
+                      <a:headEnd type="none" w="med" len="med"/>
+                      <a:tailEnd type="none" w="med" len="med"/>
+                    </a:lnB>
+                    <a:solidFill>
+                      <a:srgbClr val="FFFFFF"/>
+                    </a:solidFill>
+                  </a:tcPr>
+                </a:tc>
+                <a:tc>
+                  <a:txBody>
+                    <a:bodyPr/>
+                    <a:lstStyle/>
+                    <a:p>
+                      <a:pPr fontAlgn="t"/>
+                      <a:r>
+                        <a:rPr lang="en-CA" sz="1800">
+                          <a:effectLst/>
+                          <a:latin typeface="+mn-lt"/>
+                        </a:rPr>
+                        <a:t>Azure Event Hubs</a:t>
+                      </a:r>
+                    </a:p>
+                  </a:txBody>
+                  <a:tcPr marL="30536" marR="30536" marT="22902" marB="22902">
+                    <a:lnL w="12700" cap="flat" cmpd="sng" algn="ctr">
+                      <a:solidFill>
+                        <a:srgbClr val="E3E3E3"/>
+                      </a:solidFill>
+                      <a:prstDash val="solid"/>
+                      <a:round/>
+                      <a:headEnd type="none" w="med" len="med"/>
+                      <a:tailEnd type="none" w="med" len="med"/>
+                    </a:lnL>
+                    <a:lnR w="12700" cap="flat" cmpd="sng" algn="ctr">
+                      <a:solidFill>
+                        <a:srgbClr val="E3E3E3"/>
+                      </a:solidFill>
+                      <a:prstDash val="solid"/>
+                      <a:round/>
+                      <a:headEnd type="none" w="med" len="med"/>
+                      <a:tailEnd type="none" w="med" len="med"/>
+                    </a:lnR>
+                    <a:lnT w="4763" cap="flat" cmpd="sng" algn="ctr">
+                      <a:solidFill>
+                        <a:srgbClr val="E3E3E3"/>
+                      </a:solidFill>
+                      <a:prstDash val="solid"/>
+                      <a:round/>
+                      <a:headEnd type="none" w="med" len="med"/>
+                      <a:tailEnd type="none" w="med" len="med"/>
+                    </a:lnT>
+                    <a:lnB w="4763" cap="flat" cmpd="sng" algn="ctr">
+                      <a:solidFill>
+                        <a:srgbClr val="E3E3E3"/>
+                      </a:solidFill>
+                      <a:prstDash val="solid"/>
+                      <a:round/>
+                      <a:headEnd type="none" w="med" len="med"/>
+                      <a:tailEnd type="none" w="med" len="med"/>
+                    </a:lnB>
+                    <a:solidFill>
+                      <a:srgbClr val="FFFFFF"/>
+                    </a:solidFill>
+                  </a:tcPr>
+                </a:tc>
+                <a:tc>
+                  <a:txBody>
+                    <a:bodyPr/>
+                    <a:lstStyle/>
+                    <a:p>
+                      <a:pPr algn="ctr" fontAlgn="t"/>
+                      <a:r>
+                        <a:rPr lang="en-CA" sz="1800" dirty="0">
+                          <a:effectLst/>
+                          <a:latin typeface="+mn-lt"/>
+                        </a:rPr>
+                        <a:t>✔</a:t>
+                      </a:r>
+                    </a:p>
+                  </a:txBody>
+                  <a:tcPr marL="30536" marR="30536" marT="22902" marB="22902">
+                    <a:lnL w="12700" cap="flat" cmpd="sng" algn="ctr">
+                      <a:solidFill>
+                        <a:srgbClr val="E3E3E3"/>
+                      </a:solidFill>
+                      <a:prstDash val="solid"/>
+                      <a:round/>
+                      <a:headEnd type="none" w="med" len="med"/>
+                      <a:tailEnd type="none" w="med" len="med"/>
+                    </a:lnL>
+                    <a:lnR w="12700" cap="flat" cmpd="sng" algn="ctr">
+                      <a:solidFill>
+                        <a:srgbClr val="E3E3E3"/>
+                      </a:solidFill>
+                      <a:prstDash val="solid"/>
+                      <a:round/>
+                      <a:headEnd type="none" w="med" len="med"/>
+                      <a:tailEnd type="none" w="med" len="med"/>
+                    </a:lnR>
+                    <a:lnT w="4763" cap="flat" cmpd="sng" algn="ctr">
+                      <a:solidFill>
+                        <a:srgbClr val="E3E3E3"/>
+                      </a:solidFill>
+                      <a:prstDash val="solid"/>
+                      <a:round/>
+                      <a:headEnd type="none" w="med" len="med"/>
+                      <a:tailEnd type="none" w="med" len="med"/>
+                    </a:lnT>
+                    <a:lnB w="4763" cap="flat" cmpd="sng" algn="ctr">
+                      <a:solidFill>
+                        <a:srgbClr val="E3E3E3"/>
+                      </a:solidFill>
+                      <a:prstDash val="solid"/>
+                      <a:round/>
+                      <a:headEnd type="none" w="med" len="med"/>
+                      <a:tailEnd type="none" w="med" len="med"/>
+                    </a:lnB>
+                    <a:solidFill>
+                      <a:srgbClr val="FFFFFF"/>
+                    </a:solidFill>
+                  </a:tcPr>
+                </a:tc>
+                <a:tc>
+                  <a:txBody>
+                    <a:bodyPr/>
+                    <a:lstStyle/>
+                    <a:p>
+                      <a:pPr algn="ctr" fontAlgn="t"/>
+                      <a:endParaRPr lang="en-CA" sz="1800">
+                        <a:effectLst/>
+                        <a:latin typeface="+mn-lt"/>
+                      </a:endParaRPr>
+                    </a:p>
+                  </a:txBody>
+                  <a:tcPr marL="30536" marR="30536" marT="22902" marB="22902">
+                    <a:lnL w="12700" cap="flat" cmpd="sng" algn="ctr">
+                      <a:solidFill>
+                        <a:srgbClr val="E3E3E3"/>
+                      </a:solidFill>
+                      <a:prstDash val="solid"/>
+                      <a:round/>
+                      <a:headEnd type="none" w="med" len="med"/>
+                      <a:tailEnd type="none" w="med" len="med"/>
+                    </a:lnL>
+                    <a:lnR w="12700" cap="flat" cmpd="sng" algn="ctr">
+                      <a:solidFill>
+                        <a:srgbClr val="E3E3E3"/>
+                      </a:solidFill>
+                      <a:prstDash val="solid"/>
+                      <a:round/>
+                      <a:headEnd type="none" w="med" len="med"/>
+                      <a:tailEnd type="none" w="med" len="med"/>
+                    </a:lnR>
+                    <a:lnT w="4763" cap="flat" cmpd="sng" algn="ctr">
+                      <a:solidFill>
+                        <a:srgbClr val="E3E3E3"/>
+                      </a:solidFill>
+                      <a:prstDash val="solid"/>
+                      <a:round/>
+                      <a:headEnd type="none" w="med" len="med"/>
+                      <a:tailEnd type="none" w="med" len="med"/>
+                    </a:lnT>
+                    <a:lnB w="4763" cap="flat" cmpd="sng" algn="ctr">
+                      <a:solidFill>
+                        <a:srgbClr val="E3E3E3"/>
+                      </a:solidFill>
+                      <a:prstDash val="solid"/>
+                      <a:round/>
+                      <a:headEnd type="none" w="med" len="med"/>
+                      <a:tailEnd type="none" w="med" len="med"/>
+                    </a:lnB>
+                    <a:solidFill>
+                      <a:srgbClr val="FFFFFF"/>
+                    </a:solidFill>
+                  </a:tcPr>
+                </a:tc>
+                <a:tc>
+                  <a:txBody>
+                    <a:bodyPr/>
+                    <a:lstStyle/>
+                    <a:p>
+                      <a:pPr algn="ctr" fontAlgn="t"/>
+                      <a:r>
+                        <a:rPr lang="en-CA" sz="1800">
+                          <a:effectLst/>
+                          <a:latin typeface="+mn-lt"/>
+                        </a:rPr>
+                        <a:t>✔</a:t>
+                      </a:r>
+                    </a:p>
+                  </a:txBody>
+                  <a:tcPr marL="30536" marR="30536" marT="22902" marB="22902">
+                    <a:lnL w="12700" cap="flat" cmpd="sng" algn="ctr">
+                      <a:solidFill>
+                        <a:srgbClr val="E3E3E3"/>
+                      </a:solidFill>
+                      <a:prstDash val="solid"/>
+                      <a:round/>
+                      <a:headEnd type="none" w="med" len="med"/>
+                      <a:tailEnd type="none" w="med" len="med"/>
+                    </a:lnL>
+                    <a:lnR w="12700" cap="flat" cmpd="sng" algn="ctr">
+                      <a:solidFill>
+                        <a:srgbClr val="E3E3E3"/>
+                      </a:solidFill>
+                      <a:prstDash val="solid"/>
+                      <a:round/>
+                      <a:headEnd type="none" w="med" len="med"/>
+                      <a:tailEnd type="none" w="med" len="med"/>
+                    </a:lnR>
+                    <a:lnT w="4763" cap="flat" cmpd="sng" algn="ctr">
+                      <a:solidFill>
+                        <a:srgbClr val="E3E3E3"/>
+                      </a:solidFill>
+                      <a:prstDash val="solid"/>
+                      <a:round/>
+                      <a:headEnd type="none" w="med" len="med"/>
+                      <a:tailEnd type="none" w="med" len="med"/>
+                    </a:lnT>
+                    <a:lnB w="4763" cap="flat" cmpd="sng" algn="ctr">
+                      <a:solidFill>
+                        <a:srgbClr val="E3E3E3"/>
+                      </a:solidFill>
+                      <a:prstDash val="solid"/>
+                      <a:round/>
+                      <a:headEnd type="none" w="med" len="med"/>
+                      <a:tailEnd type="none" w="med" len="med"/>
+                    </a:lnB>
+                    <a:solidFill>
+                      <a:srgbClr val="FFFFFF"/>
+                    </a:solidFill>
+                  </a:tcPr>
+                </a:tc>
+                <a:extLst>
+                  <a:ext uri="{0D108BD9-81ED-4DB2-BD59-A6C34878D82A}">
+                    <a16:rowId xmlns:a16="http://schemas.microsoft.com/office/drawing/2014/main" val="3697716495"/>
+                  </a:ext>
+                </a:extLst>
+              </a:tr>
+              <a:tr h="375589">
+                <a:tc>
+                  <a:txBody>
+                    <a:bodyPr/>
+                    <a:lstStyle/>
+                    <a:p>
+                      <a:pPr fontAlgn="t"/>
+                      <a:r>
+                        <a:rPr lang="en-CA" sz="1800">
+                          <a:effectLst/>
+                          <a:latin typeface="+mn-lt"/>
+                        </a:rPr>
+                        <a:t>Queues</a:t>
+                      </a:r>
+                    </a:p>
+                  </a:txBody>
+                  <a:tcPr marL="30536" marR="30536" marT="22902" marB="22902">
+                    <a:lnL w="12700" cap="flat" cmpd="sng" algn="ctr">
+                      <a:solidFill>
+                        <a:srgbClr val="E3E3E3"/>
+                      </a:solidFill>
+                      <a:prstDash val="solid"/>
+                      <a:round/>
+                      <a:headEnd type="none" w="med" len="med"/>
+                      <a:tailEnd type="none" w="med" len="med"/>
+                    </a:lnL>
+                    <a:lnR w="12700" cap="flat" cmpd="sng" algn="ctr">
+                      <a:solidFill>
+                        <a:srgbClr val="E3E3E3"/>
+                      </a:solidFill>
+                      <a:prstDash val="solid"/>
+                      <a:round/>
+                      <a:headEnd type="none" w="med" len="med"/>
+                      <a:tailEnd type="none" w="med" len="med"/>
+                    </a:lnR>
+                    <a:lnT w="4763" cap="flat" cmpd="sng" algn="ctr">
+                      <a:solidFill>
+                        <a:srgbClr val="E3E3E3"/>
+                      </a:solidFill>
+                      <a:prstDash val="solid"/>
+                      <a:round/>
+                      <a:headEnd type="none" w="med" len="med"/>
+                      <a:tailEnd type="none" w="med" len="med"/>
+                    </a:lnT>
+                    <a:lnB w="4763" cap="flat" cmpd="sng" algn="ctr">
+                      <a:solidFill>
+                        <a:srgbClr val="E3E3E3"/>
+                      </a:solidFill>
+                      <a:prstDash val="solid"/>
+                      <a:round/>
+                      <a:headEnd type="none" w="med" len="med"/>
+                      <a:tailEnd type="none" w="med" len="med"/>
+                    </a:lnB>
+                    <a:solidFill>
+                      <a:srgbClr val="FFFFFF"/>
+                    </a:solidFill>
+                  </a:tcPr>
+                </a:tc>
+                <a:tc>
+                  <a:txBody>
+                    <a:bodyPr/>
+                    <a:lstStyle/>
+                    <a:p>
+                      <a:pPr fontAlgn="t"/>
+                      <a:r>
+                        <a:rPr lang="en-CA" sz="1800">
+                          <a:effectLst/>
+                          <a:latin typeface="+mn-lt"/>
+                        </a:rPr>
+                        <a:t>Azure Storage</a:t>
+                      </a:r>
+                    </a:p>
+                  </a:txBody>
+                  <a:tcPr marL="30536" marR="30536" marT="22902" marB="22902">
+                    <a:lnL w="12700" cap="flat" cmpd="sng" algn="ctr">
+                      <a:solidFill>
+                        <a:srgbClr val="E3E3E3"/>
+                      </a:solidFill>
+                      <a:prstDash val="solid"/>
+                      <a:round/>
+                      <a:headEnd type="none" w="med" len="med"/>
+                      <a:tailEnd type="none" w="med" len="med"/>
+                    </a:lnL>
+                    <a:lnR w="12700" cap="flat" cmpd="sng" algn="ctr">
+                      <a:solidFill>
+                        <a:srgbClr val="E3E3E3"/>
+                      </a:solidFill>
+                      <a:prstDash val="solid"/>
+                      <a:round/>
+                      <a:headEnd type="none" w="med" len="med"/>
+                      <a:tailEnd type="none" w="med" len="med"/>
+                    </a:lnR>
+                    <a:lnT w="4763" cap="flat" cmpd="sng" algn="ctr">
+                      <a:solidFill>
+                        <a:srgbClr val="E3E3E3"/>
+                      </a:solidFill>
+                      <a:prstDash val="solid"/>
+                      <a:round/>
+                      <a:headEnd type="none" w="med" len="med"/>
+                      <a:tailEnd type="none" w="med" len="med"/>
+                    </a:lnT>
+                    <a:lnB w="4763" cap="flat" cmpd="sng" algn="ctr">
+                      <a:solidFill>
+                        <a:srgbClr val="E3E3E3"/>
+                      </a:solidFill>
+                      <a:prstDash val="solid"/>
+                      <a:round/>
+                      <a:headEnd type="none" w="med" len="med"/>
+                      <a:tailEnd type="none" w="med" len="med"/>
+                    </a:lnB>
+                    <a:solidFill>
+                      <a:srgbClr val="FFFFFF"/>
+                    </a:solidFill>
+                  </a:tcPr>
+                </a:tc>
+                <a:tc>
+                  <a:txBody>
+                    <a:bodyPr/>
+                    <a:lstStyle/>
+                    <a:p>
+                      <a:pPr algn="ctr" fontAlgn="t"/>
+                      <a:r>
+                        <a:rPr lang="en-CA" sz="1800" dirty="0">
+                          <a:effectLst/>
+                          <a:latin typeface="+mn-lt"/>
+                        </a:rPr>
+                        <a:t>✔</a:t>
+                      </a:r>
+                    </a:p>
+                  </a:txBody>
+                  <a:tcPr marL="30536" marR="30536" marT="22902" marB="22902">
+                    <a:lnL w="12700" cap="flat" cmpd="sng" algn="ctr">
+                      <a:solidFill>
+                        <a:srgbClr val="E3E3E3"/>
+                      </a:solidFill>
+                      <a:prstDash val="solid"/>
+                      <a:round/>
+                      <a:headEnd type="none" w="med" len="med"/>
+                      <a:tailEnd type="none" w="med" len="med"/>
+                    </a:lnL>
+                    <a:lnR w="12700" cap="flat" cmpd="sng" algn="ctr">
+                      <a:solidFill>
+                        <a:srgbClr val="E3E3E3"/>
+                      </a:solidFill>
+                      <a:prstDash val="solid"/>
+                      <a:round/>
+                      <a:headEnd type="none" w="med" len="med"/>
+                      <a:tailEnd type="none" w="med" len="med"/>
+                    </a:lnR>
+                    <a:lnT w="4763" cap="flat" cmpd="sng" algn="ctr">
+                      <a:solidFill>
+                        <a:srgbClr val="E3E3E3"/>
+                      </a:solidFill>
+                      <a:prstDash val="solid"/>
+                      <a:round/>
+                      <a:headEnd type="none" w="med" len="med"/>
+                      <a:tailEnd type="none" w="med" len="med"/>
+                    </a:lnT>
+                    <a:lnB w="4763" cap="flat" cmpd="sng" algn="ctr">
+                      <a:solidFill>
+                        <a:srgbClr val="E3E3E3"/>
+                      </a:solidFill>
+                      <a:prstDash val="solid"/>
+                      <a:round/>
+                      <a:headEnd type="none" w="med" len="med"/>
+                      <a:tailEnd type="none" w="med" len="med"/>
+                    </a:lnB>
+                    <a:solidFill>
+                      <a:srgbClr val="FFFFFF"/>
+                    </a:solidFill>
+                  </a:tcPr>
+                </a:tc>
+                <a:tc>
+                  <a:txBody>
+                    <a:bodyPr/>
+                    <a:lstStyle/>
+                    <a:p>
+                      <a:pPr algn="ctr" fontAlgn="t"/>
+                      <a:endParaRPr lang="en-CA" sz="1800" dirty="0">
+                        <a:effectLst/>
+                        <a:latin typeface="+mn-lt"/>
+                      </a:endParaRPr>
+                    </a:p>
+                  </a:txBody>
+                  <a:tcPr marL="30536" marR="30536" marT="22902" marB="22902">
+                    <a:lnL w="12700" cap="flat" cmpd="sng" algn="ctr">
+                      <a:solidFill>
+                        <a:srgbClr val="E3E3E3"/>
+                      </a:solidFill>
+                      <a:prstDash val="solid"/>
+                      <a:round/>
+                      <a:headEnd type="none" w="med" len="med"/>
+                      <a:tailEnd type="none" w="med" len="med"/>
+                    </a:lnL>
+                    <a:lnR w="12700" cap="flat" cmpd="sng" algn="ctr">
+                      <a:solidFill>
+                        <a:srgbClr val="E3E3E3"/>
+                      </a:solidFill>
+                      <a:prstDash val="solid"/>
+                      <a:round/>
+                      <a:headEnd type="none" w="med" len="med"/>
+                      <a:tailEnd type="none" w="med" len="med"/>
+                    </a:lnR>
+                    <a:lnT w="4763" cap="flat" cmpd="sng" algn="ctr">
+                      <a:solidFill>
+                        <a:srgbClr val="E3E3E3"/>
+                      </a:solidFill>
+                      <a:prstDash val="solid"/>
+                      <a:round/>
+                      <a:headEnd type="none" w="med" len="med"/>
+                      <a:tailEnd type="none" w="med" len="med"/>
+                    </a:lnT>
+                    <a:lnB w="4763" cap="flat" cmpd="sng" algn="ctr">
+                      <a:solidFill>
+                        <a:srgbClr val="E3E3E3"/>
+                      </a:solidFill>
+                      <a:prstDash val="solid"/>
+                      <a:round/>
+                      <a:headEnd type="none" w="med" len="med"/>
+                      <a:tailEnd type="none" w="med" len="med"/>
+                    </a:lnB>
+                    <a:solidFill>
+                      <a:srgbClr val="FFFFFF"/>
+                    </a:solidFill>
+                  </a:tcPr>
+                </a:tc>
+                <a:tc>
+                  <a:txBody>
+                    <a:bodyPr/>
+                    <a:lstStyle/>
+                    <a:p>
+                      <a:pPr algn="ctr" fontAlgn="t"/>
+                      <a:r>
+                        <a:rPr lang="en-CA" sz="1800">
+                          <a:effectLst/>
+                          <a:latin typeface="+mn-lt"/>
+                        </a:rPr>
+                        <a:t>✔</a:t>
+                      </a:r>
+                    </a:p>
+                  </a:txBody>
+                  <a:tcPr marL="30536" marR="30536" marT="22902" marB="22902">
+                    <a:lnL w="12700" cap="flat" cmpd="sng" algn="ctr">
+                      <a:solidFill>
+                        <a:srgbClr val="E3E3E3"/>
+                      </a:solidFill>
+                      <a:prstDash val="solid"/>
+                      <a:round/>
+                      <a:headEnd type="none" w="med" len="med"/>
+                      <a:tailEnd type="none" w="med" len="med"/>
+                    </a:lnL>
+                    <a:lnR w="12700" cap="flat" cmpd="sng" algn="ctr">
+                      <a:solidFill>
+                        <a:srgbClr val="E3E3E3"/>
+                      </a:solidFill>
+                      <a:prstDash val="solid"/>
+                      <a:round/>
+                      <a:headEnd type="none" w="med" len="med"/>
+                      <a:tailEnd type="none" w="med" len="med"/>
+                    </a:lnR>
+                    <a:lnT w="4763" cap="flat" cmpd="sng" algn="ctr">
+                      <a:solidFill>
+                        <a:srgbClr val="E3E3E3"/>
+                      </a:solidFill>
+                      <a:prstDash val="solid"/>
+                      <a:round/>
+                      <a:headEnd type="none" w="med" len="med"/>
+                      <a:tailEnd type="none" w="med" len="med"/>
+                    </a:lnT>
+                    <a:lnB w="4763" cap="flat" cmpd="sng" algn="ctr">
+                      <a:solidFill>
+                        <a:srgbClr val="E3E3E3"/>
+                      </a:solidFill>
+                      <a:prstDash val="solid"/>
+                      <a:round/>
+                      <a:headEnd type="none" w="med" len="med"/>
+                      <a:tailEnd type="none" w="med" len="med"/>
+                    </a:lnB>
+                    <a:solidFill>
+                      <a:srgbClr val="FFFFFF"/>
+                    </a:solidFill>
+                  </a:tcPr>
+                </a:tc>
+                <a:extLst>
+                  <a:ext uri="{0D108BD9-81ED-4DB2-BD59-A6C34878D82A}">
+                    <a16:rowId xmlns:a16="http://schemas.microsoft.com/office/drawing/2014/main" val="2492561867"/>
+                  </a:ext>
+                </a:extLst>
+              </a:tr>
+              <a:tr h="375589">
+                <a:tc>
+                  <a:txBody>
+                    <a:bodyPr/>
+                    <a:lstStyle/>
+                    <a:p>
+                      <a:pPr fontAlgn="t"/>
+                      <a:r>
+                        <a:rPr lang="en-CA" sz="1800">
+                          <a:effectLst/>
+                          <a:latin typeface="+mn-lt"/>
+                        </a:rPr>
+                        <a:t>Tables</a:t>
+                      </a:r>
+                    </a:p>
+                  </a:txBody>
+                  <a:tcPr marL="30536" marR="30536" marT="22902" marB="22902">
+                    <a:lnL w="12700" cap="flat" cmpd="sng" algn="ctr">
+                      <a:solidFill>
+                        <a:srgbClr val="E3E3E3"/>
+                      </a:solidFill>
+                      <a:prstDash val="solid"/>
+                      <a:round/>
+                      <a:headEnd type="none" w="med" len="med"/>
+                      <a:tailEnd type="none" w="med" len="med"/>
+                    </a:lnL>
+                    <a:lnR w="12700" cap="flat" cmpd="sng" algn="ctr">
+                      <a:solidFill>
+                        <a:srgbClr val="E3E3E3"/>
+                      </a:solidFill>
+                      <a:prstDash val="solid"/>
+                      <a:round/>
+                      <a:headEnd type="none" w="med" len="med"/>
+                      <a:tailEnd type="none" w="med" len="med"/>
+                    </a:lnR>
+                    <a:lnT w="4763" cap="flat" cmpd="sng" algn="ctr">
+                      <a:solidFill>
+                        <a:srgbClr val="E3E3E3"/>
+                      </a:solidFill>
+                      <a:prstDash val="solid"/>
+                      <a:round/>
+                      <a:headEnd type="none" w="med" len="med"/>
+                      <a:tailEnd type="none" w="med" len="med"/>
+                    </a:lnT>
+                    <a:lnB w="4763" cap="flat" cmpd="sng" algn="ctr">
+                      <a:solidFill>
+                        <a:srgbClr val="E3E3E3"/>
+                      </a:solidFill>
+                      <a:prstDash val="solid"/>
+                      <a:round/>
+                      <a:headEnd type="none" w="med" len="med"/>
+                      <a:tailEnd type="none" w="med" len="med"/>
+                    </a:lnB>
+                    <a:solidFill>
+                      <a:srgbClr val="FFFFFF"/>
+                    </a:solidFill>
+                  </a:tcPr>
+                </a:tc>
+                <a:tc>
+                  <a:txBody>
+                    <a:bodyPr/>
+                    <a:lstStyle/>
+                    <a:p>
+                      <a:pPr fontAlgn="t"/>
+                      <a:r>
+                        <a:rPr lang="en-CA" sz="1800">
+                          <a:effectLst/>
+                          <a:latin typeface="+mn-lt"/>
+                        </a:rPr>
+                        <a:t>Azure Storage</a:t>
+                      </a:r>
+                    </a:p>
+                  </a:txBody>
+                  <a:tcPr marL="30536" marR="30536" marT="22902" marB="22902">
+                    <a:lnL w="12700" cap="flat" cmpd="sng" algn="ctr">
+                      <a:solidFill>
+                        <a:srgbClr val="E3E3E3"/>
+                      </a:solidFill>
+                      <a:prstDash val="solid"/>
+                      <a:round/>
+                      <a:headEnd type="none" w="med" len="med"/>
+                      <a:tailEnd type="none" w="med" len="med"/>
+                    </a:lnL>
+                    <a:lnR w="12700" cap="flat" cmpd="sng" algn="ctr">
+                      <a:solidFill>
+                        <a:srgbClr val="E3E3E3"/>
+                      </a:solidFill>
+                      <a:prstDash val="solid"/>
+                      <a:round/>
+                      <a:headEnd type="none" w="med" len="med"/>
+                      <a:tailEnd type="none" w="med" len="med"/>
+                    </a:lnR>
+                    <a:lnT w="4763" cap="flat" cmpd="sng" algn="ctr">
+                      <a:solidFill>
+                        <a:srgbClr val="E3E3E3"/>
+                      </a:solidFill>
+                      <a:prstDash val="solid"/>
+                      <a:round/>
+                      <a:headEnd type="none" w="med" len="med"/>
+                      <a:tailEnd type="none" w="med" len="med"/>
+                    </a:lnT>
+                    <a:lnB w="4763" cap="flat" cmpd="sng" algn="ctr">
+                      <a:solidFill>
+                        <a:srgbClr val="E3E3E3"/>
+                      </a:solidFill>
+                      <a:prstDash val="solid"/>
+                      <a:round/>
+                      <a:headEnd type="none" w="med" len="med"/>
+                      <a:tailEnd type="none" w="med" len="med"/>
+                    </a:lnB>
+                    <a:solidFill>
+                      <a:srgbClr val="FFFFFF"/>
+                    </a:solidFill>
+                  </a:tcPr>
+                </a:tc>
+                <a:tc>
+                  <a:txBody>
+                    <a:bodyPr/>
+                    <a:lstStyle/>
+                    <a:p>
+                      <a:pPr algn="ctr" fontAlgn="t"/>
+                      <a:endParaRPr lang="en-CA" sz="1800">
+                        <a:effectLst/>
+                        <a:latin typeface="+mn-lt"/>
+                      </a:endParaRPr>
+                    </a:p>
+                  </a:txBody>
+                  <a:tcPr marL="30536" marR="30536" marT="22902" marB="22902">
+                    <a:lnL w="12700" cap="flat" cmpd="sng" algn="ctr">
+                      <a:solidFill>
+                        <a:srgbClr val="E3E3E3"/>
+                      </a:solidFill>
+                      <a:prstDash val="solid"/>
+                      <a:round/>
+                      <a:headEnd type="none" w="med" len="med"/>
+                      <a:tailEnd type="none" w="med" len="med"/>
+                    </a:lnL>
+                    <a:lnR w="12700" cap="flat" cmpd="sng" algn="ctr">
+                      <a:solidFill>
+                        <a:srgbClr val="E3E3E3"/>
+                      </a:solidFill>
+                      <a:prstDash val="solid"/>
+                      <a:round/>
+                      <a:headEnd type="none" w="med" len="med"/>
+                      <a:tailEnd type="none" w="med" len="med"/>
+                    </a:lnR>
+                    <a:lnT w="4763" cap="flat" cmpd="sng" algn="ctr">
+                      <a:solidFill>
+                        <a:srgbClr val="E3E3E3"/>
+                      </a:solidFill>
+                      <a:prstDash val="solid"/>
+                      <a:round/>
+                      <a:headEnd type="none" w="med" len="med"/>
+                      <a:tailEnd type="none" w="med" len="med"/>
+                    </a:lnT>
+                    <a:lnB w="4763" cap="flat" cmpd="sng" algn="ctr">
+                      <a:solidFill>
+                        <a:srgbClr val="E3E3E3"/>
+                      </a:solidFill>
+                      <a:prstDash val="solid"/>
+                      <a:round/>
+                      <a:headEnd type="none" w="med" len="med"/>
+                      <a:tailEnd type="none" w="med" len="med"/>
+                    </a:lnB>
+                    <a:solidFill>
+                      <a:srgbClr val="FFFFFF"/>
+                    </a:solidFill>
+                  </a:tcPr>
+                </a:tc>
+                <a:tc>
+                  <a:txBody>
+                    <a:bodyPr/>
+                    <a:lstStyle/>
+                    <a:p>
+                      <a:pPr algn="ctr" fontAlgn="t"/>
+                      <a:r>
+                        <a:rPr lang="en-CA" sz="1800" dirty="0">
+                          <a:effectLst/>
+                          <a:latin typeface="+mn-lt"/>
+                        </a:rPr>
+                        <a:t>✔</a:t>
+                      </a:r>
+                    </a:p>
+                  </a:txBody>
+                  <a:tcPr marL="30536" marR="30536" marT="22902" marB="22902">
+                    <a:lnL w="12700" cap="flat" cmpd="sng" algn="ctr">
+                      <a:solidFill>
+                        <a:srgbClr val="E3E3E3"/>
+                      </a:solidFill>
+                      <a:prstDash val="solid"/>
+                      <a:round/>
+                      <a:headEnd type="none" w="med" len="med"/>
+                      <a:tailEnd type="none" w="med" len="med"/>
+                    </a:lnL>
+                    <a:lnR w="12700" cap="flat" cmpd="sng" algn="ctr">
+                      <a:solidFill>
+                        <a:srgbClr val="E3E3E3"/>
+                      </a:solidFill>
+                      <a:prstDash val="solid"/>
+                      <a:round/>
+                      <a:headEnd type="none" w="med" len="med"/>
+                      <a:tailEnd type="none" w="med" len="med"/>
+                    </a:lnR>
+                    <a:lnT w="4763" cap="flat" cmpd="sng" algn="ctr">
+                      <a:solidFill>
+                        <a:srgbClr val="E3E3E3"/>
+                      </a:solidFill>
+                      <a:prstDash val="solid"/>
+                      <a:round/>
+                      <a:headEnd type="none" w="med" len="med"/>
+                      <a:tailEnd type="none" w="med" len="med"/>
+                    </a:lnT>
+                    <a:lnB w="4763" cap="flat" cmpd="sng" algn="ctr">
+                      <a:solidFill>
+                        <a:srgbClr val="E3E3E3"/>
+                      </a:solidFill>
+                      <a:prstDash val="solid"/>
+                      <a:round/>
+                      <a:headEnd type="none" w="med" len="med"/>
+                      <a:tailEnd type="none" w="med" len="med"/>
+                    </a:lnB>
+                    <a:solidFill>
+                      <a:srgbClr val="FFFFFF"/>
+                    </a:solidFill>
+                  </a:tcPr>
+                </a:tc>
+                <a:tc>
+                  <a:txBody>
+                    <a:bodyPr/>
+                    <a:lstStyle/>
+                    <a:p>
+                      <a:pPr algn="ctr" fontAlgn="t"/>
+                      <a:r>
+                        <a:rPr lang="en-CA" sz="1800">
+                          <a:effectLst/>
+                          <a:latin typeface="+mn-lt"/>
+                        </a:rPr>
+                        <a:t>✔</a:t>
+                      </a:r>
+                    </a:p>
+                  </a:txBody>
+                  <a:tcPr marL="30536" marR="30536" marT="22902" marB="22902">
+                    <a:lnL w="12700" cap="flat" cmpd="sng" algn="ctr">
+                      <a:solidFill>
+                        <a:srgbClr val="E3E3E3"/>
+                      </a:solidFill>
+                      <a:prstDash val="solid"/>
+                      <a:round/>
+                      <a:headEnd type="none" w="med" len="med"/>
+                      <a:tailEnd type="none" w="med" len="med"/>
+                    </a:lnL>
+                    <a:lnR w="12700" cap="flat" cmpd="sng" algn="ctr">
+                      <a:solidFill>
+                        <a:srgbClr val="E3E3E3"/>
+                      </a:solidFill>
+                      <a:prstDash val="solid"/>
+                      <a:round/>
+                      <a:headEnd type="none" w="med" len="med"/>
+                      <a:tailEnd type="none" w="med" len="med"/>
+                    </a:lnR>
+                    <a:lnT w="4763" cap="flat" cmpd="sng" algn="ctr">
+                      <a:solidFill>
+                        <a:srgbClr val="E3E3E3"/>
+                      </a:solidFill>
+                      <a:prstDash val="solid"/>
+                      <a:round/>
+                      <a:headEnd type="none" w="med" len="med"/>
+                      <a:tailEnd type="none" w="med" len="med"/>
+                    </a:lnT>
+                    <a:lnB w="4763" cap="flat" cmpd="sng" algn="ctr">
+                      <a:solidFill>
+                        <a:srgbClr val="E3E3E3"/>
+                      </a:solidFill>
+                      <a:prstDash val="solid"/>
+                      <a:round/>
+                      <a:headEnd type="none" w="med" len="med"/>
+                      <a:tailEnd type="none" w="med" len="med"/>
+                    </a:lnB>
+                    <a:solidFill>
+                      <a:srgbClr val="FFFFFF"/>
+                    </a:solidFill>
+                  </a:tcPr>
+                </a:tc>
+                <a:extLst>
+                  <a:ext uri="{0D108BD9-81ED-4DB2-BD59-A6C34878D82A}">
+                    <a16:rowId xmlns:a16="http://schemas.microsoft.com/office/drawing/2014/main" val="3686956199"/>
+                  </a:ext>
+                </a:extLst>
+              </a:tr>
+              <a:tr h="375589">
+                <a:tc>
+                  <a:txBody>
+                    <a:bodyPr/>
+                    <a:lstStyle/>
+                    <a:p>
+                      <a:pPr fontAlgn="t"/>
+                      <a:r>
+                        <a:rPr lang="en-CA" sz="1800">
+                          <a:effectLst/>
+                          <a:latin typeface="+mn-lt"/>
+                        </a:rPr>
+                        <a:t>Tables</a:t>
+                      </a:r>
+                    </a:p>
+                  </a:txBody>
+                  <a:tcPr marL="30536" marR="30536" marT="22902" marB="22902">
+                    <a:lnL w="12700" cap="flat" cmpd="sng" algn="ctr">
+                      <a:solidFill>
+                        <a:srgbClr val="E3E3E3"/>
+                      </a:solidFill>
+                      <a:prstDash val="solid"/>
+                      <a:round/>
+                      <a:headEnd type="none" w="med" len="med"/>
+                      <a:tailEnd type="none" w="med" len="med"/>
+                    </a:lnL>
+                    <a:lnR w="12700" cap="flat" cmpd="sng" algn="ctr">
+                      <a:solidFill>
+                        <a:srgbClr val="E3E3E3"/>
+                      </a:solidFill>
+                      <a:prstDash val="solid"/>
+                      <a:round/>
+                      <a:headEnd type="none" w="med" len="med"/>
+                      <a:tailEnd type="none" w="med" len="med"/>
+                    </a:lnR>
+                    <a:lnT w="4763" cap="flat" cmpd="sng" algn="ctr">
+                      <a:solidFill>
+                        <a:srgbClr val="E3E3E3"/>
+                      </a:solidFill>
+                      <a:prstDash val="solid"/>
+                      <a:round/>
+                      <a:headEnd type="none" w="med" len="med"/>
+                      <a:tailEnd type="none" w="med" len="med"/>
+                    </a:lnT>
+                    <a:lnB w="4763" cap="flat" cmpd="sng" algn="ctr">
+                      <a:solidFill>
+                        <a:srgbClr val="E3E3E3"/>
+                      </a:solidFill>
+                      <a:prstDash val="solid"/>
+                      <a:round/>
+                      <a:headEnd type="none" w="med" len="med"/>
+                      <a:tailEnd type="none" w="med" len="med"/>
+                    </a:lnB>
+                    <a:solidFill>
+                      <a:srgbClr val="FFFFFF"/>
+                    </a:solidFill>
+                  </a:tcPr>
+                </a:tc>
+                <a:tc>
+                  <a:txBody>
+                    <a:bodyPr/>
+                    <a:lstStyle/>
+                    <a:p>
+                      <a:pPr fontAlgn="t"/>
+                      <a:r>
+                        <a:rPr lang="en-CA" sz="1800">
+                          <a:effectLst/>
+                          <a:latin typeface="+mn-lt"/>
+                        </a:rPr>
+                        <a:t>Azure Mobile Apps</a:t>
+                      </a:r>
+                    </a:p>
+                  </a:txBody>
+                  <a:tcPr marL="30536" marR="30536" marT="22902" marB="22902">
+                    <a:lnL w="12700" cap="flat" cmpd="sng" algn="ctr">
+                      <a:solidFill>
+                        <a:srgbClr val="E3E3E3"/>
+                      </a:solidFill>
+                      <a:prstDash val="solid"/>
+                      <a:round/>
+                      <a:headEnd type="none" w="med" len="med"/>
+                      <a:tailEnd type="none" w="med" len="med"/>
+                    </a:lnL>
+                    <a:lnR w="12700" cap="flat" cmpd="sng" algn="ctr">
+                      <a:solidFill>
+                        <a:srgbClr val="E3E3E3"/>
+                      </a:solidFill>
+                      <a:prstDash val="solid"/>
+                      <a:round/>
+                      <a:headEnd type="none" w="med" len="med"/>
+                      <a:tailEnd type="none" w="med" len="med"/>
+                    </a:lnR>
+                    <a:lnT w="4763" cap="flat" cmpd="sng" algn="ctr">
+                      <a:solidFill>
+                        <a:srgbClr val="E3E3E3"/>
+                      </a:solidFill>
+                      <a:prstDash val="solid"/>
+                      <a:round/>
+                      <a:headEnd type="none" w="med" len="med"/>
+                      <a:tailEnd type="none" w="med" len="med"/>
+                    </a:lnT>
+                    <a:lnB w="4763" cap="flat" cmpd="sng" algn="ctr">
+                      <a:solidFill>
+                        <a:srgbClr val="E3E3E3"/>
+                      </a:solidFill>
+                      <a:prstDash val="solid"/>
+                      <a:round/>
+                      <a:headEnd type="none" w="med" len="med"/>
+                      <a:tailEnd type="none" w="med" len="med"/>
+                    </a:lnB>
+                    <a:solidFill>
+                      <a:srgbClr val="FFFFFF"/>
+                    </a:solidFill>
+                  </a:tcPr>
+                </a:tc>
+                <a:tc>
+                  <a:txBody>
+                    <a:bodyPr/>
+                    <a:lstStyle/>
+                    <a:p>
+                      <a:pPr algn="ctr" fontAlgn="t"/>
+                      <a:endParaRPr lang="en-CA" sz="1800">
+                        <a:effectLst/>
+                        <a:latin typeface="+mn-lt"/>
+                      </a:endParaRPr>
+                    </a:p>
+                  </a:txBody>
+                  <a:tcPr marL="30536" marR="30536" marT="22902" marB="22902">
+                    <a:lnL w="12700" cap="flat" cmpd="sng" algn="ctr">
+                      <a:solidFill>
+                        <a:srgbClr val="E3E3E3"/>
+                      </a:solidFill>
+                      <a:prstDash val="solid"/>
+                      <a:round/>
+                      <a:headEnd type="none" w="med" len="med"/>
+                      <a:tailEnd type="none" w="med" len="med"/>
+                    </a:lnL>
+                    <a:lnR w="12700" cap="flat" cmpd="sng" algn="ctr">
+                      <a:solidFill>
+                        <a:srgbClr val="E3E3E3"/>
+                      </a:solidFill>
+                      <a:prstDash val="solid"/>
+                      <a:round/>
+                      <a:headEnd type="none" w="med" len="med"/>
+                      <a:tailEnd type="none" w="med" len="med"/>
+                    </a:lnR>
+                    <a:lnT w="4763" cap="flat" cmpd="sng" algn="ctr">
+                      <a:solidFill>
+                        <a:srgbClr val="E3E3E3"/>
+                      </a:solidFill>
+                      <a:prstDash val="solid"/>
+                      <a:round/>
+                      <a:headEnd type="none" w="med" len="med"/>
+                      <a:tailEnd type="none" w="med" len="med"/>
+                    </a:lnT>
+                    <a:lnB w="4763" cap="flat" cmpd="sng" algn="ctr">
+                      <a:solidFill>
+                        <a:srgbClr val="E3E3E3"/>
+                      </a:solidFill>
+                      <a:prstDash val="solid"/>
+                      <a:round/>
+                      <a:headEnd type="none" w="med" len="med"/>
+                      <a:tailEnd type="none" w="med" len="med"/>
+                    </a:lnB>
+                    <a:solidFill>
+                      <a:srgbClr val="FFFFFF"/>
+                    </a:solidFill>
+                  </a:tcPr>
+                </a:tc>
+                <a:tc>
+                  <a:txBody>
+                    <a:bodyPr/>
+                    <a:lstStyle/>
+                    <a:p>
+                      <a:pPr algn="ctr" fontAlgn="t"/>
+                      <a:r>
+                        <a:rPr lang="en-CA" sz="1800" dirty="0">
+                          <a:effectLst/>
+                          <a:latin typeface="+mn-lt"/>
+                        </a:rPr>
+                        <a:t>✔</a:t>
+                      </a:r>
+                    </a:p>
+                  </a:txBody>
+                  <a:tcPr marL="30536" marR="30536" marT="22902" marB="22902">
+                    <a:lnL w="12700" cap="flat" cmpd="sng" algn="ctr">
+                      <a:solidFill>
+                        <a:srgbClr val="E3E3E3"/>
+                      </a:solidFill>
+                      <a:prstDash val="solid"/>
+                      <a:round/>
+                      <a:headEnd type="none" w="med" len="med"/>
+                      <a:tailEnd type="none" w="med" len="med"/>
+                    </a:lnL>
+                    <a:lnR w="12700" cap="flat" cmpd="sng" algn="ctr">
+                      <a:solidFill>
+                        <a:srgbClr val="E3E3E3"/>
+                      </a:solidFill>
+                      <a:prstDash val="solid"/>
+                      <a:round/>
+                      <a:headEnd type="none" w="med" len="med"/>
+                      <a:tailEnd type="none" w="med" len="med"/>
+                    </a:lnR>
+                    <a:lnT w="4763" cap="flat" cmpd="sng" algn="ctr">
+                      <a:solidFill>
+                        <a:srgbClr val="E3E3E3"/>
+                      </a:solidFill>
+                      <a:prstDash val="solid"/>
+                      <a:round/>
+                      <a:headEnd type="none" w="med" len="med"/>
+                      <a:tailEnd type="none" w="med" len="med"/>
+                    </a:lnT>
+                    <a:lnB w="4763" cap="flat" cmpd="sng" algn="ctr">
+                      <a:solidFill>
+                        <a:srgbClr val="E3E3E3"/>
+                      </a:solidFill>
+                      <a:prstDash val="solid"/>
+                      <a:round/>
+                      <a:headEnd type="none" w="med" len="med"/>
+                      <a:tailEnd type="none" w="med" len="med"/>
+                    </a:lnB>
+                    <a:solidFill>
+                      <a:srgbClr val="FFFFFF"/>
+                    </a:solidFill>
+                  </a:tcPr>
+                </a:tc>
+                <a:tc>
+                  <a:txBody>
+                    <a:bodyPr/>
+                    <a:lstStyle/>
+                    <a:p>
+                      <a:pPr algn="ctr" fontAlgn="t"/>
+                      <a:r>
+                        <a:rPr lang="en-CA" sz="1800">
+                          <a:effectLst/>
+                          <a:latin typeface="+mn-lt"/>
+                        </a:rPr>
+                        <a:t>✔</a:t>
+                      </a:r>
+                    </a:p>
+                  </a:txBody>
+                  <a:tcPr marL="30536" marR="30536" marT="22902" marB="22902">
+                    <a:lnL w="12700" cap="flat" cmpd="sng" algn="ctr">
+                      <a:solidFill>
+                        <a:srgbClr val="E3E3E3"/>
+                      </a:solidFill>
+                      <a:prstDash val="solid"/>
+                      <a:round/>
+                      <a:headEnd type="none" w="med" len="med"/>
+                      <a:tailEnd type="none" w="med" len="med"/>
+                    </a:lnL>
+                    <a:lnR w="12700" cap="flat" cmpd="sng" algn="ctr">
+                      <a:solidFill>
+                        <a:srgbClr val="E3E3E3"/>
+                      </a:solidFill>
+                      <a:prstDash val="solid"/>
+                      <a:round/>
+                      <a:headEnd type="none" w="med" len="med"/>
+                      <a:tailEnd type="none" w="med" len="med"/>
+                    </a:lnR>
+                    <a:lnT w="4763" cap="flat" cmpd="sng" algn="ctr">
+                      <a:solidFill>
+                        <a:srgbClr val="E3E3E3"/>
+                      </a:solidFill>
+                      <a:prstDash val="solid"/>
+                      <a:round/>
+                      <a:headEnd type="none" w="med" len="med"/>
+                      <a:tailEnd type="none" w="med" len="med"/>
+                    </a:lnT>
+                    <a:lnB w="4763" cap="flat" cmpd="sng" algn="ctr">
+                      <a:solidFill>
+                        <a:srgbClr val="E3E3E3"/>
+                      </a:solidFill>
+                      <a:prstDash val="solid"/>
+                      <a:round/>
+                      <a:headEnd type="none" w="med" len="med"/>
+                      <a:tailEnd type="none" w="med" len="med"/>
+                    </a:lnB>
+                    <a:solidFill>
+                      <a:srgbClr val="FFFFFF"/>
+                    </a:solidFill>
+                  </a:tcPr>
+                </a:tc>
+                <a:extLst>
+                  <a:ext uri="{0D108BD9-81ED-4DB2-BD59-A6C34878D82A}">
+                    <a16:rowId xmlns:a16="http://schemas.microsoft.com/office/drawing/2014/main" val="91242444"/>
+                  </a:ext>
+                </a:extLst>
+              </a:tr>
+              <a:tr h="375589">
+                <a:tc>
+                  <a:txBody>
+                    <a:bodyPr/>
+                    <a:lstStyle/>
+                    <a:p>
+                      <a:pPr fontAlgn="t"/>
+                      <a:r>
+                        <a:rPr lang="en-CA" sz="1800">
+                          <a:effectLst/>
+                          <a:latin typeface="+mn-lt"/>
+                        </a:rPr>
+                        <a:t>No-SQL DB</a:t>
+                      </a:r>
+                    </a:p>
+                  </a:txBody>
+                  <a:tcPr marL="30536" marR="30536" marT="22902" marB="22902">
+                    <a:lnL w="12700" cap="flat" cmpd="sng" algn="ctr">
+                      <a:solidFill>
+                        <a:srgbClr val="E3E3E3"/>
+                      </a:solidFill>
+                      <a:prstDash val="solid"/>
+                      <a:round/>
+                      <a:headEnd type="none" w="med" len="med"/>
+                      <a:tailEnd type="none" w="med" len="med"/>
+                    </a:lnL>
+                    <a:lnR w="12700" cap="flat" cmpd="sng" algn="ctr">
+                      <a:solidFill>
+                        <a:srgbClr val="E3E3E3"/>
+                      </a:solidFill>
+                      <a:prstDash val="solid"/>
+                      <a:round/>
+                      <a:headEnd type="none" w="med" len="med"/>
+                      <a:tailEnd type="none" w="med" len="med"/>
+                    </a:lnR>
+                    <a:lnT w="4763" cap="flat" cmpd="sng" algn="ctr">
+                      <a:solidFill>
+                        <a:srgbClr val="E3E3E3"/>
+                      </a:solidFill>
+                      <a:prstDash val="solid"/>
+                      <a:round/>
+                      <a:headEnd type="none" w="med" len="med"/>
+                      <a:tailEnd type="none" w="med" len="med"/>
+                    </a:lnT>
+                    <a:lnB w="4763" cap="flat" cmpd="sng" algn="ctr">
+                      <a:solidFill>
+                        <a:srgbClr val="E3E3E3"/>
+                      </a:solidFill>
+                      <a:prstDash val="solid"/>
+                      <a:round/>
+                      <a:headEnd type="none" w="med" len="med"/>
+                      <a:tailEnd type="none" w="med" len="med"/>
+                    </a:lnB>
+                    <a:solidFill>
+                      <a:srgbClr val="FFFFFF"/>
+                    </a:solidFill>
+                  </a:tcPr>
+                </a:tc>
+                <a:tc>
+                  <a:txBody>
+                    <a:bodyPr/>
+                    <a:lstStyle/>
+                    <a:p>
+                      <a:pPr fontAlgn="t"/>
+                      <a:r>
+                        <a:rPr lang="en-CA" sz="1800">
+                          <a:effectLst/>
+                          <a:latin typeface="+mn-lt"/>
+                        </a:rPr>
+                        <a:t>Azure DocumentDB</a:t>
+                      </a:r>
+                    </a:p>
+                  </a:txBody>
+                  <a:tcPr marL="30536" marR="30536" marT="22902" marB="22902">
+                    <a:lnL w="12700" cap="flat" cmpd="sng" algn="ctr">
+                      <a:solidFill>
+                        <a:srgbClr val="E3E3E3"/>
+                      </a:solidFill>
+                      <a:prstDash val="solid"/>
+                      <a:round/>
+                      <a:headEnd type="none" w="med" len="med"/>
+                      <a:tailEnd type="none" w="med" len="med"/>
+                    </a:lnL>
+                    <a:lnR w="12700" cap="flat" cmpd="sng" algn="ctr">
+                      <a:solidFill>
+                        <a:srgbClr val="E3E3E3"/>
+                      </a:solidFill>
+                      <a:prstDash val="solid"/>
+                      <a:round/>
+                      <a:headEnd type="none" w="med" len="med"/>
+                      <a:tailEnd type="none" w="med" len="med"/>
+                    </a:lnR>
+                    <a:lnT w="4763" cap="flat" cmpd="sng" algn="ctr">
+                      <a:solidFill>
+                        <a:srgbClr val="E3E3E3"/>
+                      </a:solidFill>
+                      <a:prstDash val="solid"/>
+                      <a:round/>
+                      <a:headEnd type="none" w="med" len="med"/>
+                      <a:tailEnd type="none" w="med" len="med"/>
+                    </a:lnT>
+                    <a:lnB w="4763" cap="flat" cmpd="sng" algn="ctr">
+                      <a:solidFill>
+                        <a:srgbClr val="E3E3E3"/>
+                      </a:solidFill>
+                      <a:prstDash val="solid"/>
+                      <a:round/>
+                      <a:headEnd type="none" w="med" len="med"/>
+                      <a:tailEnd type="none" w="med" len="med"/>
+                    </a:lnB>
+                    <a:solidFill>
+                      <a:srgbClr val="FFFFFF"/>
+                    </a:solidFill>
+                  </a:tcPr>
+                </a:tc>
+                <a:tc>
+                  <a:txBody>
+                    <a:bodyPr/>
+                    <a:lstStyle/>
+                    <a:p>
+                      <a:pPr algn="ctr" fontAlgn="t"/>
+                      <a:endParaRPr lang="en-CA" sz="1800">
+                        <a:effectLst/>
+                        <a:latin typeface="+mn-lt"/>
+                      </a:endParaRPr>
+                    </a:p>
+                  </a:txBody>
+                  <a:tcPr marL="30536" marR="30536" marT="22902" marB="22902">
+                    <a:lnL w="12700" cap="flat" cmpd="sng" algn="ctr">
+                      <a:solidFill>
+                        <a:srgbClr val="E3E3E3"/>
+                      </a:solidFill>
+                      <a:prstDash val="solid"/>
+                      <a:round/>
+                      <a:headEnd type="none" w="med" len="med"/>
+                      <a:tailEnd type="none" w="med" len="med"/>
+                    </a:lnL>
+                    <a:lnR w="12700" cap="flat" cmpd="sng" algn="ctr">
+                      <a:solidFill>
+                        <a:srgbClr val="E3E3E3"/>
+                      </a:solidFill>
+                      <a:prstDash val="solid"/>
+                      <a:round/>
+                      <a:headEnd type="none" w="med" len="med"/>
+                      <a:tailEnd type="none" w="med" len="med"/>
+                    </a:lnR>
+                    <a:lnT w="4763" cap="flat" cmpd="sng" algn="ctr">
+                      <a:solidFill>
+                        <a:srgbClr val="E3E3E3"/>
+                      </a:solidFill>
+                      <a:prstDash val="solid"/>
+                      <a:round/>
+                      <a:headEnd type="none" w="med" len="med"/>
+                      <a:tailEnd type="none" w="med" len="med"/>
+                    </a:lnT>
+                    <a:lnB w="4763" cap="flat" cmpd="sng" algn="ctr">
+                      <a:solidFill>
+                        <a:srgbClr val="E3E3E3"/>
+                      </a:solidFill>
+                      <a:prstDash val="solid"/>
+                      <a:round/>
+                      <a:headEnd type="none" w="med" len="med"/>
+                      <a:tailEnd type="none" w="med" len="med"/>
+                    </a:lnB>
+                    <a:solidFill>
+                      <a:srgbClr val="FFFFFF"/>
+                    </a:solidFill>
+                  </a:tcPr>
+                </a:tc>
+                <a:tc>
+                  <a:txBody>
+                    <a:bodyPr/>
+                    <a:lstStyle/>
+                    <a:p>
+                      <a:pPr algn="ctr" fontAlgn="t"/>
+                      <a:r>
+                        <a:rPr lang="en-CA" sz="1800" dirty="0">
+                          <a:effectLst/>
+                          <a:latin typeface="+mn-lt"/>
+                        </a:rPr>
+                        <a:t>✔</a:t>
+                      </a:r>
+                    </a:p>
+                  </a:txBody>
+                  <a:tcPr marL="30536" marR="30536" marT="22902" marB="22902">
+                    <a:lnL w="12700" cap="flat" cmpd="sng" algn="ctr">
+                      <a:solidFill>
+                        <a:srgbClr val="E3E3E3"/>
+                      </a:solidFill>
+                      <a:prstDash val="solid"/>
+                      <a:round/>
+                      <a:headEnd type="none" w="med" len="med"/>
+                      <a:tailEnd type="none" w="med" len="med"/>
+                    </a:lnL>
+                    <a:lnR w="12700" cap="flat" cmpd="sng" algn="ctr">
+                      <a:solidFill>
+                        <a:srgbClr val="E3E3E3"/>
+                      </a:solidFill>
+                      <a:prstDash val="solid"/>
+                      <a:round/>
+                      <a:headEnd type="none" w="med" len="med"/>
+                      <a:tailEnd type="none" w="med" len="med"/>
+                    </a:lnR>
+                    <a:lnT w="4763" cap="flat" cmpd="sng" algn="ctr">
+                      <a:solidFill>
+                        <a:srgbClr val="E3E3E3"/>
+                      </a:solidFill>
+                      <a:prstDash val="solid"/>
+                      <a:round/>
+                      <a:headEnd type="none" w="med" len="med"/>
+                      <a:tailEnd type="none" w="med" len="med"/>
+                    </a:lnT>
+                    <a:lnB w="4763" cap="flat" cmpd="sng" algn="ctr">
+                      <a:solidFill>
+                        <a:srgbClr val="E3E3E3"/>
+                      </a:solidFill>
+                      <a:prstDash val="solid"/>
+                      <a:round/>
+                      <a:headEnd type="none" w="med" len="med"/>
+                      <a:tailEnd type="none" w="med" len="med"/>
+                    </a:lnB>
+                    <a:solidFill>
+                      <a:srgbClr val="FFFFFF"/>
+                    </a:solidFill>
+                  </a:tcPr>
+                </a:tc>
+                <a:tc>
+                  <a:txBody>
+                    <a:bodyPr/>
+                    <a:lstStyle/>
+                    <a:p>
+                      <a:pPr algn="ctr" fontAlgn="t"/>
+                      <a:r>
+                        <a:rPr lang="en-CA" sz="1800">
+                          <a:effectLst/>
+                          <a:latin typeface="+mn-lt"/>
+                        </a:rPr>
+                        <a:t>✔</a:t>
+                      </a:r>
+                    </a:p>
+                  </a:txBody>
+                  <a:tcPr marL="30536" marR="30536" marT="22902" marB="22902">
+                    <a:lnL w="12700" cap="flat" cmpd="sng" algn="ctr">
+                      <a:solidFill>
+                        <a:srgbClr val="E3E3E3"/>
+                      </a:solidFill>
+                      <a:prstDash val="solid"/>
+                      <a:round/>
+                      <a:headEnd type="none" w="med" len="med"/>
+                      <a:tailEnd type="none" w="med" len="med"/>
+                    </a:lnL>
+                    <a:lnR w="12700" cap="flat" cmpd="sng" algn="ctr">
+                      <a:solidFill>
+                        <a:srgbClr val="E3E3E3"/>
+                      </a:solidFill>
+                      <a:prstDash val="solid"/>
+                      <a:round/>
+                      <a:headEnd type="none" w="med" len="med"/>
+                      <a:tailEnd type="none" w="med" len="med"/>
+                    </a:lnR>
+                    <a:lnT w="4763" cap="flat" cmpd="sng" algn="ctr">
+                      <a:solidFill>
+                        <a:srgbClr val="E3E3E3"/>
+                      </a:solidFill>
+                      <a:prstDash val="solid"/>
+                      <a:round/>
+                      <a:headEnd type="none" w="med" len="med"/>
+                      <a:tailEnd type="none" w="med" len="med"/>
+                    </a:lnT>
+                    <a:lnB w="4763" cap="flat" cmpd="sng" algn="ctr">
+                      <a:solidFill>
+                        <a:srgbClr val="E3E3E3"/>
+                      </a:solidFill>
+                      <a:prstDash val="solid"/>
+                      <a:round/>
+                      <a:headEnd type="none" w="med" len="med"/>
+                      <a:tailEnd type="none" w="med" len="med"/>
+                    </a:lnB>
+                    <a:solidFill>
+                      <a:srgbClr val="FFFFFF"/>
+                    </a:solidFill>
+                  </a:tcPr>
+                </a:tc>
+                <a:extLst>
+                  <a:ext uri="{0D108BD9-81ED-4DB2-BD59-A6C34878D82A}">
+                    <a16:rowId xmlns:a16="http://schemas.microsoft.com/office/drawing/2014/main" val="211821463"/>
+                  </a:ext>
+                </a:extLst>
+              </a:tr>
+              <a:tr h="414943">
+                <a:tc>
+                  <a:txBody>
+                    <a:bodyPr/>
+                    <a:lstStyle/>
+                    <a:p>
+                      <a:pPr fontAlgn="t"/>
+                      <a:r>
+                        <a:rPr lang="en-CA" sz="1800">
+                          <a:effectLst/>
+                          <a:latin typeface="+mn-lt"/>
+                        </a:rPr>
+                        <a:t>Push Notifications</a:t>
+                      </a:r>
+                    </a:p>
+                  </a:txBody>
+                  <a:tcPr marL="30536" marR="30536" marT="22902" marB="22902">
+                    <a:lnL w="12700" cap="flat" cmpd="sng" algn="ctr">
+                      <a:solidFill>
+                        <a:srgbClr val="E3E3E3"/>
+                      </a:solidFill>
+                      <a:prstDash val="solid"/>
+                      <a:round/>
+                      <a:headEnd type="none" w="med" len="med"/>
+                      <a:tailEnd type="none" w="med" len="med"/>
+                    </a:lnL>
+                    <a:lnR w="12700" cap="flat" cmpd="sng" algn="ctr">
+                      <a:solidFill>
+                        <a:srgbClr val="E3E3E3"/>
+                      </a:solidFill>
+                      <a:prstDash val="solid"/>
+                      <a:round/>
+                      <a:headEnd type="none" w="med" len="med"/>
+                      <a:tailEnd type="none" w="med" len="med"/>
+                    </a:lnR>
+                    <a:lnT w="4763" cap="flat" cmpd="sng" algn="ctr">
+                      <a:solidFill>
+                        <a:srgbClr val="E3E3E3"/>
+                      </a:solidFill>
+                      <a:prstDash val="solid"/>
+                      <a:round/>
+                      <a:headEnd type="none" w="med" len="med"/>
+                      <a:tailEnd type="none" w="med" len="med"/>
+                    </a:lnT>
+                    <a:lnB w="4763" cap="flat" cmpd="sng" algn="ctr">
+                      <a:solidFill>
+                        <a:srgbClr val="E3E3E3"/>
+                      </a:solidFill>
+                      <a:prstDash val="solid"/>
+                      <a:round/>
+                      <a:headEnd type="none" w="med" len="med"/>
+                      <a:tailEnd type="none" w="med" len="med"/>
+                    </a:lnB>
+                    <a:solidFill>
+                      <a:srgbClr val="FFFFFF"/>
+                    </a:solidFill>
+                  </a:tcPr>
+                </a:tc>
+                <a:tc>
+                  <a:txBody>
+                    <a:bodyPr/>
+                    <a:lstStyle/>
+                    <a:p>
+                      <a:pPr fontAlgn="t"/>
+                      <a:r>
+                        <a:rPr lang="en-CA" sz="1800">
+                          <a:effectLst/>
+                          <a:latin typeface="+mn-lt"/>
+                        </a:rPr>
+                        <a:t>Azure Notification Hubs</a:t>
+                      </a:r>
+                    </a:p>
+                  </a:txBody>
+                  <a:tcPr marL="30536" marR="30536" marT="22902" marB="22902">
+                    <a:lnL w="12700" cap="flat" cmpd="sng" algn="ctr">
+                      <a:solidFill>
+                        <a:srgbClr val="E3E3E3"/>
+                      </a:solidFill>
+                      <a:prstDash val="solid"/>
+                      <a:round/>
+                      <a:headEnd type="none" w="med" len="med"/>
+                      <a:tailEnd type="none" w="med" len="med"/>
+                    </a:lnL>
+                    <a:lnR w="12700" cap="flat" cmpd="sng" algn="ctr">
+                      <a:solidFill>
+                        <a:srgbClr val="E3E3E3"/>
+                      </a:solidFill>
+                      <a:prstDash val="solid"/>
+                      <a:round/>
+                      <a:headEnd type="none" w="med" len="med"/>
+                      <a:tailEnd type="none" w="med" len="med"/>
+                    </a:lnR>
+                    <a:lnT w="4763" cap="flat" cmpd="sng" algn="ctr">
+                      <a:solidFill>
+                        <a:srgbClr val="E3E3E3"/>
+                      </a:solidFill>
+                      <a:prstDash val="solid"/>
+                      <a:round/>
+                      <a:headEnd type="none" w="med" len="med"/>
+                      <a:tailEnd type="none" w="med" len="med"/>
+                    </a:lnT>
+                    <a:lnB w="4763" cap="flat" cmpd="sng" algn="ctr">
+                      <a:solidFill>
+                        <a:srgbClr val="E3E3E3"/>
+                      </a:solidFill>
+                      <a:prstDash val="solid"/>
+                      <a:round/>
+                      <a:headEnd type="none" w="med" len="med"/>
+                      <a:tailEnd type="none" w="med" len="med"/>
+                    </a:lnB>
+                    <a:solidFill>
+                      <a:srgbClr val="FFFFFF"/>
+                    </a:solidFill>
+                  </a:tcPr>
+                </a:tc>
+                <a:tc>
+                  <a:txBody>
+                    <a:bodyPr/>
+                    <a:lstStyle/>
+                    <a:p>
+                      <a:pPr algn="ctr" fontAlgn="t"/>
+                      <a:endParaRPr lang="en-CA" sz="1800">
+                        <a:effectLst/>
+                        <a:latin typeface="+mn-lt"/>
+                      </a:endParaRPr>
+                    </a:p>
+                  </a:txBody>
+                  <a:tcPr marL="30536" marR="30536" marT="22902" marB="22902">
+                    <a:lnL w="12700" cap="flat" cmpd="sng" algn="ctr">
+                      <a:solidFill>
+                        <a:srgbClr val="E3E3E3"/>
+                      </a:solidFill>
+                      <a:prstDash val="solid"/>
+                      <a:round/>
+                      <a:headEnd type="none" w="med" len="med"/>
+                      <a:tailEnd type="none" w="med" len="med"/>
+                    </a:lnL>
+                    <a:lnR w="12700" cap="flat" cmpd="sng" algn="ctr">
+                      <a:solidFill>
+                        <a:srgbClr val="E3E3E3"/>
+                      </a:solidFill>
+                      <a:prstDash val="solid"/>
+                      <a:round/>
+                      <a:headEnd type="none" w="med" len="med"/>
+                      <a:tailEnd type="none" w="med" len="med"/>
+                    </a:lnR>
+                    <a:lnT w="4763" cap="flat" cmpd="sng" algn="ctr">
+                      <a:solidFill>
+                        <a:srgbClr val="E3E3E3"/>
+                      </a:solidFill>
+                      <a:prstDash val="solid"/>
+                      <a:round/>
+                      <a:headEnd type="none" w="med" len="med"/>
+                      <a:tailEnd type="none" w="med" len="med"/>
+                    </a:lnT>
+                    <a:lnB w="4763" cap="flat" cmpd="sng" algn="ctr">
+                      <a:solidFill>
+                        <a:srgbClr val="E3E3E3"/>
+                      </a:solidFill>
+                      <a:prstDash val="solid"/>
+                      <a:round/>
+                      <a:headEnd type="none" w="med" len="med"/>
+                      <a:tailEnd type="none" w="med" len="med"/>
+                    </a:lnB>
+                    <a:solidFill>
+                      <a:srgbClr val="FFFFFF"/>
+                    </a:solidFill>
+                  </a:tcPr>
+                </a:tc>
+                <a:tc>
+                  <a:txBody>
+                    <a:bodyPr/>
+                    <a:lstStyle/>
+                    <a:p>
+                      <a:pPr algn="ctr" fontAlgn="t"/>
+                      <a:endParaRPr lang="en-CA" sz="1800" dirty="0">
+                        <a:effectLst/>
+                        <a:latin typeface="+mn-lt"/>
+                      </a:endParaRPr>
+                    </a:p>
+                  </a:txBody>
+                  <a:tcPr marL="30536" marR="30536" marT="22902" marB="22902">
+                    <a:lnL w="12700" cap="flat" cmpd="sng" algn="ctr">
+                      <a:solidFill>
+                        <a:srgbClr val="E3E3E3"/>
+                      </a:solidFill>
+                      <a:prstDash val="solid"/>
+                      <a:round/>
+                      <a:headEnd type="none" w="med" len="med"/>
+                      <a:tailEnd type="none" w="med" len="med"/>
+                    </a:lnL>
+                    <a:lnR w="12700" cap="flat" cmpd="sng" algn="ctr">
+                      <a:solidFill>
+                        <a:srgbClr val="E3E3E3"/>
+                      </a:solidFill>
+                      <a:prstDash val="solid"/>
+                      <a:round/>
+                      <a:headEnd type="none" w="med" len="med"/>
+                      <a:tailEnd type="none" w="med" len="med"/>
+                    </a:lnR>
+                    <a:lnT w="4763" cap="flat" cmpd="sng" algn="ctr">
+                      <a:solidFill>
+                        <a:srgbClr val="E3E3E3"/>
+                      </a:solidFill>
+                      <a:prstDash val="solid"/>
+                      <a:round/>
+                      <a:headEnd type="none" w="med" len="med"/>
+                      <a:tailEnd type="none" w="med" len="med"/>
+                    </a:lnT>
+                    <a:lnB w="4763" cap="flat" cmpd="sng" algn="ctr">
+                      <a:solidFill>
+                        <a:srgbClr val="E3E3E3"/>
+                      </a:solidFill>
+                      <a:prstDash val="solid"/>
+                      <a:round/>
+                      <a:headEnd type="none" w="med" len="med"/>
+                      <a:tailEnd type="none" w="med" len="med"/>
+                    </a:lnB>
+                    <a:solidFill>
+                      <a:srgbClr val="FFFFFF"/>
+                    </a:solidFill>
+                  </a:tcPr>
+                </a:tc>
+                <a:tc>
+                  <a:txBody>
+                    <a:bodyPr/>
+                    <a:lstStyle/>
+                    <a:p>
+                      <a:pPr algn="ctr" fontAlgn="t"/>
+                      <a:r>
+                        <a:rPr lang="en-CA" sz="1800" dirty="0">
+                          <a:effectLst/>
+                          <a:latin typeface="+mn-lt"/>
+                        </a:rPr>
+                        <a:t>✔</a:t>
+                      </a:r>
+                    </a:p>
+                  </a:txBody>
+                  <a:tcPr marL="30536" marR="30536" marT="22902" marB="22902">
+                    <a:lnL w="12700" cap="flat" cmpd="sng" algn="ctr">
+                      <a:solidFill>
+                        <a:srgbClr val="E3E3E3"/>
+                      </a:solidFill>
+                      <a:prstDash val="solid"/>
+                      <a:round/>
+                      <a:headEnd type="none" w="med" len="med"/>
+                      <a:tailEnd type="none" w="med" len="med"/>
+                    </a:lnL>
+                    <a:lnR w="12700" cap="flat" cmpd="sng" algn="ctr">
+                      <a:solidFill>
+                        <a:srgbClr val="E3E3E3"/>
+                      </a:solidFill>
+                      <a:prstDash val="solid"/>
+                      <a:round/>
+                      <a:headEnd type="none" w="med" len="med"/>
+                      <a:tailEnd type="none" w="med" len="med"/>
+                    </a:lnR>
+                    <a:lnT w="4763" cap="flat" cmpd="sng" algn="ctr">
+                      <a:solidFill>
+                        <a:srgbClr val="E3E3E3"/>
+                      </a:solidFill>
+                      <a:prstDash val="solid"/>
+                      <a:round/>
+                      <a:headEnd type="none" w="med" len="med"/>
+                      <a:tailEnd type="none" w="med" len="med"/>
+                    </a:lnT>
+                    <a:lnB w="4763" cap="flat" cmpd="sng" algn="ctr">
+                      <a:solidFill>
+                        <a:srgbClr val="E3E3E3"/>
+                      </a:solidFill>
+                      <a:prstDash val="solid"/>
+                      <a:round/>
+                      <a:headEnd type="none" w="med" len="med"/>
+                      <a:tailEnd type="none" w="med" len="med"/>
+                    </a:lnB>
+                    <a:solidFill>
+                      <a:srgbClr val="FFFFFF"/>
+                    </a:solidFill>
+                  </a:tcPr>
+                </a:tc>
+                <a:extLst>
+                  <a:ext uri="{0D108BD9-81ED-4DB2-BD59-A6C34878D82A}">
+                    <a16:rowId xmlns:a16="http://schemas.microsoft.com/office/drawing/2014/main" val="1731219982"/>
+                  </a:ext>
+                </a:extLst>
+              </a:tr>
+              <a:tr h="375589">
+                <a:tc>
+                  <a:txBody>
+                    <a:bodyPr/>
+                    <a:lstStyle/>
+                    <a:p>
+                      <a:pPr fontAlgn="t"/>
+                      <a:r>
+                        <a:rPr lang="en-CA" sz="1800" dirty="0" err="1">
+                          <a:effectLst/>
+                          <a:latin typeface="+mn-lt"/>
+                        </a:rPr>
+                        <a:t>Twilio</a:t>
+                      </a:r>
+                      <a:r>
+                        <a:rPr lang="en-CA" sz="1800" dirty="0">
+                          <a:effectLst/>
+                          <a:latin typeface="+mn-lt"/>
+                        </a:rPr>
+                        <a:t> SMS Text</a:t>
+                      </a:r>
+                    </a:p>
+                  </a:txBody>
+                  <a:tcPr marL="30536" marR="30536" marT="22902" marB="22902">
+                    <a:lnL w="12700" cap="flat" cmpd="sng" algn="ctr">
+                      <a:solidFill>
+                        <a:srgbClr val="E3E3E3"/>
+                      </a:solidFill>
+                      <a:prstDash val="solid"/>
+                      <a:round/>
+                      <a:headEnd type="none" w="med" len="med"/>
+                      <a:tailEnd type="none" w="med" len="med"/>
+                    </a:lnL>
+                    <a:lnR w="12700" cap="flat" cmpd="sng" algn="ctr">
+                      <a:solidFill>
+                        <a:srgbClr val="E3E3E3"/>
+                      </a:solidFill>
+                      <a:prstDash val="solid"/>
+                      <a:round/>
+                      <a:headEnd type="none" w="med" len="med"/>
+                      <a:tailEnd type="none" w="med" len="med"/>
+                    </a:lnR>
+                    <a:lnT w="4763" cap="flat" cmpd="sng" algn="ctr">
+                      <a:solidFill>
+                        <a:srgbClr val="E3E3E3"/>
+                      </a:solidFill>
+                      <a:prstDash val="solid"/>
+                      <a:round/>
+                      <a:headEnd type="none" w="med" len="med"/>
+                      <a:tailEnd type="none" w="med" len="med"/>
+                    </a:lnT>
+                    <a:lnB w="12700" cap="flat" cmpd="sng" algn="ctr">
+                      <a:solidFill>
+                        <a:srgbClr val="E3E3E3"/>
+                      </a:solidFill>
+                      <a:prstDash val="solid"/>
+                      <a:round/>
+                      <a:headEnd type="none" w="med" len="med"/>
+                      <a:tailEnd type="none" w="med" len="med"/>
+                    </a:lnB>
+                    <a:solidFill>
+                      <a:srgbClr val="FFFFFF"/>
+                    </a:solidFill>
+                  </a:tcPr>
+                </a:tc>
+                <a:tc>
+                  <a:txBody>
+                    <a:bodyPr/>
+                    <a:lstStyle/>
+                    <a:p>
+                      <a:pPr fontAlgn="t"/>
+                      <a:r>
+                        <a:rPr lang="en-CA" sz="1800">
+                          <a:effectLst/>
+                          <a:latin typeface="+mn-lt"/>
+                        </a:rPr>
+                        <a:t>Twilio</a:t>
+                      </a:r>
+                    </a:p>
+                  </a:txBody>
+                  <a:tcPr marL="30536" marR="30536" marT="22902" marB="22902">
+                    <a:lnL w="12700" cap="flat" cmpd="sng" algn="ctr">
+                      <a:solidFill>
+                        <a:srgbClr val="E3E3E3"/>
+                      </a:solidFill>
+                      <a:prstDash val="solid"/>
+                      <a:round/>
+                      <a:headEnd type="none" w="med" len="med"/>
+                      <a:tailEnd type="none" w="med" len="med"/>
+                    </a:lnL>
+                    <a:lnR w="12700" cap="flat" cmpd="sng" algn="ctr">
+                      <a:solidFill>
+                        <a:srgbClr val="E3E3E3"/>
+                      </a:solidFill>
+                      <a:prstDash val="solid"/>
+                      <a:round/>
+                      <a:headEnd type="none" w="med" len="med"/>
+                      <a:tailEnd type="none" w="med" len="med"/>
+                    </a:lnR>
+                    <a:lnT w="4763" cap="flat" cmpd="sng" algn="ctr">
+                      <a:solidFill>
+                        <a:srgbClr val="E3E3E3"/>
+                      </a:solidFill>
+                      <a:prstDash val="solid"/>
+                      <a:round/>
+                      <a:headEnd type="none" w="med" len="med"/>
+                      <a:tailEnd type="none" w="med" len="med"/>
+                    </a:lnT>
+                    <a:lnB w="12700" cap="flat" cmpd="sng" algn="ctr">
+                      <a:solidFill>
+                        <a:srgbClr val="E3E3E3"/>
+                      </a:solidFill>
+                      <a:prstDash val="solid"/>
+                      <a:round/>
+                      <a:headEnd type="none" w="med" len="med"/>
+                      <a:tailEnd type="none" w="med" len="med"/>
+                    </a:lnB>
+                    <a:solidFill>
+                      <a:srgbClr val="FFFFFF"/>
+                    </a:solidFill>
+                  </a:tcPr>
+                </a:tc>
+                <a:tc>
+                  <a:txBody>
+                    <a:bodyPr/>
+                    <a:lstStyle/>
+                    <a:p>
+                      <a:pPr algn="ctr" fontAlgn="t"/>
+                      <a:endParaRPr lang="en-CA" sz="1800">
+                        <a:effectLst/>
+                        <a:latin typeface="+mn-lt"/>
+                      </a:endParaRPr>
+                    </a:p>
+                  </a:txBody>
+                  <a:tcPr marL="30536" marR="30536" marT="22902" marB="22902">
+                    <a:lnL w="12700" cap="flat" cmpd="sng" algn="ctr">
+                      <a:solidFill>
+                        <a:srgbClr val="E3E3E3"/>
+                      </a:solidFill>
+                      <a:prstDash val="solid"/>
+                      <a:round/>
+                      <a:headEnd type="none" w="med" len="med"/>
+                      <a:tailEnd type="none" w="med" len="med"/>
+                    </a:lnL>
+                    <a:lnR w="12700" cap="flat" cmpd="sng" algn="ctr">
+                      <a:solidFill>
+                        <a:srgbClr val="E3E3E3"/>
+                      </a:solidFill>
+                      <a:prstDash val="solid"/>
+                      <a:round/>
+                      <a:headEnd type="none" w="med" len="med"/>
+                      <a:tailEnd type="none" w="med" len="med"/>
+                    </a:lnR>
+                    <a:lnT w="4763" cap="flat" cmpd="sng" algn="ctr">
+                      <a:solidFill>
+                        <a:srgbClr val="E3E3E3"/>
+                      </a:solidFill>
+                      <a:prstDash val="solid"/>
+                      <a:round/>
+                      <a:headEnd type="none" w="med" len="med"/>
+                      <a:tailEnd type="none" w="med" len="med"/>
+                    </a:lnT>
+                    <a:lnB w="12700" cap="flat" cmpd="sng" algn="ctr">
+                      <a:solidFill>
+                        <a:srgbClr val="E3E3E3"/>
+                      </a:solidFill>
+                      <a:prstDash val="solid"/>
+                      <a:round/>
+                      <a:headEnd type="none" w="med" len="med"/>
+                      <a:tailEnd type="none" w="med" len="med"/>
+                    </a:lnB>
+                    <a:solidFill>
+                      <a:srgbClr val="FFFFFF"/>
+                    </a:solidFill>
+                  </a:tcPr>
+                </a:tc>
+                <a:tc>
+                  <a:txBody>
+                    <a:bodyPr/>
+                    <a:lstStyle/>
+                    <a:p>
+                      <a:pPr algn="ctr" fontAlgn="t"/>
+                      <a:endParaRPr lang="en-CA" sz="1800" dirty="0">
+                        <a:effectLst/>
+                        <a:latin typeface="+mn-lt"/>
+                      </a:endParaRPr>
+                    </a:p>
+                  </a:txBody>
+                  <a:tcPr marL="30536" marR="30536" marT="22902" marB="22902">
+                    <a:lnL w="12700" cap="flat" cmpd="sng" algn="ctr">
+                      <a:solidFill>
+                        <a:srgbClr val="E3E3E3"/>
+                      </a:solidFill>
+                      <a:prstDash val="solid"/>
+                      <a:round/>
+                      <a:headEnd type="none" w="med" len="med"/>
+                      <a:tailEnd type="none" w="med" len="med"/>
+                    </a:lnL>
+                    <a:lnR w="12700" cap="flat" cmpd="sng" algn="ctr">
+                      <a:solidFill>
+                        <a:srgbClr val="E3E3E3"/>
+                      </a:solidFill>
+                      <a:prstDash val="solid"/>
+                      <a:round/>
+                      <a:headEnd type="none" w="med" len="med"/>
+                      <a:tailEnd type="none" w="med" len="med"/>
+                    </a:lnR>
+                    <a:lnT w="4763" cap="flat" cmpd="sng" algn="ctr">
+                      <a:solidFill>
+                        <a:srgbClr val="E3E3E3"/>
+                      </a:solidFill>
+                      <a:prstDash val="solid"/>
+                      <a:round/>
+                      <a:headEnd type="none" w="med" len="med"/>
+                      <a:tailEnd type="none" w="med" len="med"/>
+                    </a:lnT>
+                    <a:lnB w="12700" cap="flat" cmpd="sng" algn="ctr">
+                      <a:solidFill>
+                        <a:srgbClr val="E3E3E3"/>
+                      </a:solidFill>
+                      <a:prstDash val="solid"/>
+                      <a:round/>
+                      <a:headEnd type="none" w="med" len="med"/>
+                      <a:tailEnd type="none" w="med" len="med"/>
+                    </a:lnB>
+                    <a:solidFill>
+                      <a:srgbClr val="FFFFFF"/>
+                    </a:solidFill>
+                  </a:tcPr>
+                </a:tc>
+                <a:tc>
+                  <a:txBody>
+                    <a:bodyPr/>
+                    <a:lstStyle/>
+                    <a:p>
+                      <a:pPr algn="ctr" fontAlgn="t"/>
+                      <a:r>
+                        <a:rPr lang="en-CA" sz="1800" dirty="0">
+                          <a:effectLst/>
+                          <a:latin typeface="+mn-lt"/>
+                        </a:rPr>
+                        <a:t>✔</a:t>
+                      </a:r>
+                    </a:p>
+                  </a:txBody>
+                  <a:tcPr marL="30536" marR="30536" marT="22902" marB="22902">
+                    <a:lnL w="12700" cap="flat" cmpd="sng" algn="ctr">
+                      <a:solidFill>
+                        <a:srgbClr val="E3E3E3"/>
+                      </a:solidFill>
+                      <a:prstDash val="solid"/>
+                      <a:round/>
+                      <a:headEnd type="none" w="med" len="med"/>
+                      <a:tailEnd type="none" w="med" len="med"/>
+                    </a:lnL>
+                    <a:lnR w="12700" cap="flat" cmpd="sng" algn="ctr">
+                      <a:solidFill>
+                        <a:srgbClr val="E3E3E3"/>
+                      </a:solidFill>
+                      <a:prstDash val="solid"/>
+                      <a:round/>
+                      <a:headEnd type="none" w="med" len="med"/>
+                      <a:tailEnd type="none" w="med" len="med"/>
+                    </a:lnR>
+                    <a:lnT w="4763" cap="flat" cmpd="sng" algn="ctr">
+                      <a:solidFill>
+                        <a:srgbClr val="E3E3E3"/>
+                      </a:solidFill>
+                      <a:prstDash val="solid"/>
+                      <a:round/>
+                      <a:headEnd type="none" w="med" len="med"/>
+                      <a:tailEnd type="none" w="med" len="med"/>
+                    </a:lnT>
+                    <a:lnB w="12700" cap="flat" cmpd="sng" algn="ctr">
+                      <a:solidFill>
+                        <a:srgbClr val="E3E3E3"/>
+                      </a:solidFill>
+                      <a:prstDash val="solid"/>
+                      <a:round/>
+                      <a:headEnd type="none" w="med" len="med"/>
+                      <a:tailEnd type="none" w="med" len="med"/>
+                    </a:lnB>
+                    <a:solidFill>
+                      <a:srgbClr val="FFFFFF"/>
+                    </a:solidFill>
+                  </a:tcPr>
+                </a:tc>
+                <a:extLst>
+                  <a:ext uri="{0D108BD9-81ED-4DB2-BD59-A6C34878D82A}">
+                    <a16:rowId xmlns:a16="http://schemas.microsoft.com/office/drawing/2014/main" val="3944668402"/>
+                  </a:ext>
+                </a:extLst>
+              </a:tr>
+            </a:tbl>
+          </a:graphicData>
+        </a:graphic>
+      </p:graphicFrame>
+      <p:sp>
+        <p:nvSpPr>
+          <p:cNvPr id="5" name="TextBox 4"/>
+          <p:cNvSpPr txBox="1"/>
+          <p:nvPr/>
+        </p:nvSpPr>
+        <p:spPr>
+          <a:xfrm>
+            <a:off x="748747" y="5780782"/>
+            <a:ext cx="11624236" cy="1077218"/>
+          </a:xfrm>
+          <a:prstGeom prst="rect">
+            <a:avLst/>
+          </a:prstGeom>
+          <a:noFill/>
+        </p:spPr>
+        <p:txBody>
+          <a:bodyPr wrap="square" rtlCol="0">
+            <a:spAutoFit/>
+          </a:bodyPr>
+          <a:lstStyle/>
+          <a:p>
+            <a:r>
+              <a:rPr lang="en-US" sz="1400" dirty="0"/>
+              <a:t>* </a:t>
+            </a:r>
+            <a:r>
+              <a:rPr lang="en-CA" sz="1400" dirty="0"/>
+              <a:t>requires an HTTP trigger</a:t>
+            </a:r>
+          </a:p>
+          <a:p>
+            <a:endParaRPr lang="en-US" sz="1400" dirty="0"/>
+          </a:p>
+          <a:p>
+            <a:r>
+              <a:rPr lang="en-US" dirty="0"/>
+              <a:t>SaaS File (OneDrive, Google Drive, </a:t>
+            </a:r>
+            <a:r>
+              <a:rPr lang="en-US" dirty="0" err="1"/>
+              <a:t>DropBox</a:t>
+            </a:r>
+            <a:r>
+              <a:rPr lang="en-US" dirty="0"/>
+              <a:t>, </a:t>
+            </a:r>
+            <a:r>
+              <a:rPr lang="en-US" dirty="0" err="1"/>
+              <a:t>etc</a:t>
+            </a:r>
+            <a:r>
+              <a:rPr lang="en-US" dirty="0"/>
+              <a:t>)</a:t>
+            </a:r>
+          </a:p>
+          <a:p>
+            <a:r>
+              <a:rPr lang="en-US" dirty="0"/>
+              <a:t>SaaS Table (</a:t>
+            </a:r>
+            <a:r>
+              <a:rPr lang="en-US" dirty="0" err="1"/>
+              <a:t>SalesForce</a:t>
+            </a:r>
+            <a:r>
+              <a:rPr lang="en-US" dirty="0"/>
+              <a:t>, Dynamics, Google Sheets, </a:t>
+            </a:r>
+            <a:r>
+              <a:rPr lang="en-US" dirty="0" err="1"/>
+              <a:t>etc</a:t>
+            </a:r>
+            <a:r>
+              <a:rPr lang="en-US" dirty="0"/>
+              <a:t>)</a:t>
+            </a:r>
+          </a:p>
+        </p:txBody>
+      </p:sp>
+    </p:spTree>
+    <p:extLst>
+      <p:ext uri="{BB962C8B-B14F-4D97-AF65-F5344CB8AC3E}">
+        <p14:creationId xmlns:p14="http://schemas.microsoft.com/office/powerpoint/2010/main" val="407024493"/>
+      </p:ext>
+    </p:extLst>
+  </p:cSld>
+  <p:clrMapOvr>
+    <a:masterClrMapping/>
+  </p:clrMapOvr>
+  <p:transition>
+    <p:fade/>
+  </p:transition>
+</p:sld>
+</file>
+
+<file path=ppt/slides/slide8.xml><?xml version="1.0" encoding="utf-8"?>
 <p:sld xmlns:a="http://schemas.openxmlformats.org/drawingml/2006/main" xmlns:r="http://schemas.openxmlformats.org/officeDocument/2006/relationships" xmlns:p="http://schemas.openxmlformats.org/presentationml/2006/main">
   <p:cSld>
     <p:spTree>
@@ -23955,7 +27561,7 @@
 </p:sld>
 </file>
 
-<file path=ppt/slides/slide8.xml><?xml version="1.0" encoding="utf-8"?>
+<file path=ppt/slides/slide9.xml><?xml version="1.0" encoding="utf-8"?>
 <p:sld xmlns:a="http://schemas.openxmlformats.org/drawingml/2006/main" xmlns:r="http://schemas.openxmlformats.org/officeDocument/2006/relationships" xmlns:p="http://schemas.openxmlformats.org/presentationml/2006/main">
   <p:cSld>
     <p:spTree>
@@ -24192,273 +27798,6 @@
       <p:bldP spid="3" grpId="0"/>
     </p:bldLst>
   </p:timing>
-</p:sld>
-</file>
-
-<file path=ppt/slides/slide9.xml><?xml version="1.0" encoding="utf-8"?>
-<p:sld xmlns:a="http://schemas.openxmlformats.org/drawingml/2006/main" xmlns:r="http://schemas.openxmlformats.org/officeDocument/2006/relationships" xmlns:p="http://schemas.openxmlformats.org/presentationml/2006/main">
-  <p:cSld>
-    <p:spTree>
-      <p:nvGrpSpPr>
-        <p:cNvPr id="1" name=""/>
-        <p:cNvGrpSpPr/>
-        <p:nvPr/>
-      </p:nvGrpSpPr>
-      <p:grpSpPr>
-        <a:xfrm>
-          <a:off x="0" y="0"/>
-          <a:ext cx="0" cy="0"/>
-          <a:chOff x="0" y="0"/>
-          <a:chExt cx="0" cy="0"/>
-        </a:xfrm>
-      </p:grpSpPr>
-      <p:sp>
-        <p:nvSpPr>
-          <p:cNvPr id="14" name="Title 1"/>
-          <p:cNvSpPr>
-            <a:spLocks noGrp="1"/>
-          </p:cNvSpPr>
-          <p:nvPr>
-            <p:ph type="title"/>
-          </p:nvPr>
-        </p:nvSpPr>
-        <p:spPr>
-          <a:xfrm>
-            <a:off x="0" y="0"/>
-            <a:ext cx="12192000" cy="1325563"/>
-          </a:xfrm>
-          <a:solidFill>
-            <a:srgbClr val="0070C0"/>
-          </a:solidFill>
-        </p:spPr>
-        <p:txBody>
-          <a:bodyPr/>
-          <a:lstStyle/>
-          <a:p>
-            <a:r>
-              <a:rPr lang="en-US" b="1" dirty="0">
-                <a:solidFill>
-                  <a:schemeClr val="bg1"/>
-                </a:solidFill>
-              </a:rPr>
-              <a:t>Triggers</a:t>
-            </a:r>
-            <a:endParaRPr lang="en-CA" b="1" dirty="0">
-              <a:solidFill>
-                <a:schemeClr val="bg1"/>
-              </a:solidFill>
-            </a:endParaRPr>
-          </a:p>
-        </p:txBody>
-      </p:sp>
-      <p:sp>
-        <p:nvSpPr>
-          <p:cNvPr id="3" name="TextBox 2"/>
-          <p:cNvSpPr txBox="1"/>
-          <p:nvPr/>
-        </p:nvSpPr>
-        <p:spPr>
-          <a:xfrm>
-            <a:off x="262964" y="1618147"/>
-            <a:ext cx="11624236" cy="5262979"/>
-          </a:xfrm>
-          <a:prstGeom prst="rect">
-            <a:avLst/>
-          </a:prstGeom>
-          <a:noFill/>
-        </p:spPr>
-        <p:txBody>
-          <a:bodyPr wrap="square" rtlCol="0">
-            <a:spAutoFit/>
-          </a:bodyPr>
-          <a:lstStyle/>
-          <a:p>
-            <a:pPr marL="571500" indent="-571500">
-              <a:buFontTx/>
-              <a:buChar char="-"/>
-            </a:pPr>
-            <a:r>
-              <a:rPr lang="en-US" sz="2800" dirty="0"/>
-              <a:t>Manual trigger (portal)</a:t>
-            </a:r>
-          </a:p>
-          <a:p>
-            <a:pPr marL="571500" indent="-571500">
-              <a:buFontTx/>
-              <a:buChar char="-"/>
-            </a:pPr>
-            <a:r>
-              <a:rPr lang="en-US" sz="2800" dirty="0"/>
-              <a:t>Timer</a:t>
-            </a:r>
-          </a:p>
-          <a:p>
-            <a:pPr marL="571500" indent="-571500">
-              <a:buFontTx/>
-              <a:buChar char="-"/>
-            </a:pPr>
-            <a:r>
-              <a:rPr lang="en-US" sz="2800" dirty="0"/>
-              <a:t>HTTP</a:t>
-            </a:r>
-          </a:p>
-          <a:p>
-            <a:pPr marL="571500" indent="-571500">
-              <a:buFontTx/>
-              <a:buChar char="-"/>
-            </a:pPr>
-            <a:r>
-              <a:rPr lang="en-US" sz="2800" dirty="0"/>
-              <a:t>Generic </a:t>
-            </a:r>
-            <a:r>
-              <a:rPr lang="en-US" sz="2800" dirty="0" err="1"/>
-              <a:t>webhook</a:t>
-            </a:r>
-            <a:r>
-              <a:rPr lang="en-US" sz="2800" dirty="0"/>
-              <a:t> / GitHub </a:t>
-            </a:r>
-            <a:r>
-              <a:rPr lang="en-US" sz="2800" dirty="0" err="1"/>
-              <a:t>webhook</a:t>
-            </a:r>
-            <a:r>
-              <a:rPr lang="en-US" sz="2800" dirty="0"/>
-              <a:t> / Slack </a:t>
-            </a:r>
-            <a:r>
-              <a:rPr lang="en-US" sz="2800" dirty="0" err="1"/>
-              <a:t>webhook</a:t>
-            </a:r>
-            <a:endParaRPr lang="en-US" sz="2800" dirty="0"/>
-          </a:p>
-          <a:p>
-            <a:pPr marL="571500" indent="-571500">
-              <a:buFontTx/>
-              <a:buChar char="-"/>
-            </a:pPr>
-            <a:r>
-              <a:rPr lang="en-US" sz="2800" dirty="0"/>
-              <a:t>Storage Queue</a:t>
-            </a:r>
-          </a:p>
-          <a:p>
-            <a:pPr marL="571500" indent="-571500">
-              <a:buFontTx/>
-              <a:buChar char="-"/>
-            </a:pPr>
-            <a:r>
-              <a:rPr lang="en-US" sz="2800" dirty="0"/>
-              <a:t>Storage Blob</a:t>
-            </a:r>
-          </a:p>
-          <a:p>
-            <a:pPr marL="571500" indent="-571500">
-              <a:buFontTx/>
-              <a:buChar char="-"/>
-            </a:pPr>
-            <a:r>
-              <a:rPr lang="en-US" sz="2800" dirty="0"/>
-              <a:t>Storage Table</a:t>
-            </a:r>
-          </a:p>
-          <a:p>
-            <a:pPr marL="571500" indent="-571500">
-              <a:buFontTx/>
-              <a:buChar char="-"/>
-            </a:pPr>
-            <a:r>
-              <a:rPr lang="en-US" sz="2800" dirty="0" err="1"/>
-              <a:t>EventHub</a:t>
-            </a:r>
-            <a:endParaRPr lang="en-US" sz="2800" dirty="0"/>
-          </a:p>
-          <a:p>
-            <a:pPr marL="571500" indent="-571500">
-              <a:buFontTx/>
-              <a:buChar char="-"/>
-            </a:pPr>
-            <a:r>
-              <a:rPr lang="en-US" sz="2800" dirty="0"/>
-              <a:t>SaaS File (OneDrive, Google Drive, </a:t>
-            </a:r>
-            <a:r>
-              <a:rPr lang="en-US" sz="2800" dirty="0" err="1"/>
-              <a:t>DropBox</a:t>
-            </a:r>
-            <a:r>
-              <a:rPr lang="en-US" sz="2800" dirty="0"/>
-              <a:t>, </a:t>
-            </a:r>
-            <a:r>
-              <a:rPr lang="en-US" sz="2800" dirty="0" err="1"/>
-              <a:t>etc</a:t>
-            </a:r>
-            <a:r>
-              <a:rPr lang="en-US" sz="2800" dirty="0"/>
-              <a:t>)</a:t>
-            </a:r>
-          </a:p>
-          <a:p>
-            <a:pPr marL="571500" indent="-571500">
-              <a:buFontTx/>
-              <a:buChar char="-"/>
-            </a:pPr>
-            <a:r>
-              <a:rPr lang="en-US" sz="2800" dirty="0"/>
-              <a:t>SaaS Table (</a:t>
-            </a:r>
-            <a:r>
-              <a:rPr lang="en-US" sz="2800" dirty="0" err="1"/>
-              <a:t>SalesForce</a:t>
-            </a:r>
-            <a:r>
-              <a:rPr lang="en-US" sz="2800" dirty="0"/>
-              <a:t>, Dynamics, Google Sheets, </a:t>
-            </a:r>
-            <a:r>
-              <a:rPr lang="en-US" sz="2800" dirty="0" err="1"/>
-              <a:t>etc</a:t>
-            </a:r>
-            <a:r>
-              <a:rPr lang="en-US" sz="2800" dirty="0"/>
-              <a:t>)</a:t>
-            </a:r>
-          </a:p>
-          <a:p>
-            <a:pPr marL="571500" indent="-571500">
-              <a:buFontTx/>
-              <a:buChar char="-"/>
-            </a:pPr>
-            <a:r>
-              <a:rPr lang="en-US" sz="2800" dirty="0" err="1"/>
-              <a:t>DocumentDB</a:t>
-            </a:r>
-            <a:endParaRPr lang="en-US" sz="2800" dirty="0"/>
-          </a:p>
-          <a:p>
-            <a:pPr marL="571500" indent="-571500">
-              <a:buFontTx/>
-              <a:buChar char="-"/>
-            </a:pPr>
-            <a:endParaRPr lang="en-US" sz="2800" dirty="0"/>
-          </a:p>
-        </p:txBody>
-      </p:sp>
-    </p:spTree>
-    <p:extLst>
-      <p:ext uri="{BB962C8B-B14F-4D97-AF65-F5344CB8AC3E}">
-        <p14:creationId xmlns:p14="http://schemas.microsoft.com/office/powerpoint/2010/main" val="407024493"/>
-      </p:ext>
-    </p:extLst>
-  </p:cSld>
-  <p:clrMapOvr>
-    <a:masterClrMapping/>
-  </p:clrMapOvr>
-  <p:transition>
-    <p:fade/>
-  </p:transition>
 </p:sld>
 </file>
 

</xml_diff>

<commit_message>
Added link to the GH issue related to the demo
</commit_message>
<xml_diff>
--- a/AzureFunctions.pptx
+++ b/AzureFunctions.pptx
@@ -2815,7 +2815,7 @@
           <a:p>
             <a:fld id="{3B673598-C1AF-41DD-9D6A-E21EA6AA4E6A}" type="datetimeFigureOut">
               <a:rPr lang="en-CA" smtClean="0"/>
-              <a:t>2016-11-21</a:t>
+              <a:t>2016-11-22</a:t>
             </a:fld>
             <a:endParaRPr lang="en-CA"/>
           </a:p>
@@ -3205,7 +3205,7 @@
           <a:p>
             <a:fld id="{7D10C09F-FCA1-48C8-B40D-42E1045D109E}" type="datetime8">
               <a:rPr lang="en-US" smtClean="0"/>
-              <a:t>11/21/2016 11:56 PM</a:t>
+              <a:t>11/22/2016 3:46 PM</a:t>
             </a:fld>
             <a:endParaRPr lang="en-US" dirty="0"/>
           </a:p>
@@ -3684,7 +3684,7 @@
           <a:p>
             <a:fld id="{9B1F1BED-FA34-4EDB-9E83-DA45C78E247E}" type="datetimeFigureOut">
               <a:rPr lang="en-CA" smtClean="0"/>
-              <a:t>2016-11-21</a:t>
+              <a:t>2016-11-22</a:t>
             </a:fld>
             <a:endParaRPr lang="en-CA"/>
           </a:p>
@@ -3854,7 +3854,7 @@
           <a:p>
             <a:fld id="{9B1F1BED-FA34-4EDB-9E83-DA45C78E247E}" type="datetimeFigureOut">
               <a:rPr lang="en-CA" smtClean="0"/>
-              <a:t>2016-11-21</a:t>
+              <a:t>2016-11-22</a:t>
             </a:fld>
             <a:endParaRPr lang="en-CA"/>
           </a:p>
@@ -4034,7 +4034,7 @@
           <a:p>
             <a:fld id="{9B1F1BED-FA34-4EDB-9E83-DA45C78E247E}" type="datetimeFigureOut">
               <a:rPr lang="en-CA" smtClean="0"/>
-              <a:t>2016-11-21</a:t>
+              <a:t>2016-11-22</a:t>
             </a:fld>
             <a:endParaRPr lang="en-CA"/>
           </a:p>
@@ -4446,7 +4446,7 @@
           <a:p>
             <a:fld id="{9B1F1BED-FA34-4EDB-9E83-DA45C78E247E}" type="datetimeFigureOut">
               <a:rPr lang="en-CA" smtClean="0"/>
-              <a:t>2016-11-21</a:t>
+              <a:t>2016-11-22</a:t>
             </a:fld>
             <a:endParaRPr lang="en-CA"/>
           </a:p>
@@ -4692,7 +4692,7 @@
           <a:p>
             <a:fld id="{9B1F1BED-FA34-4EDB-9E83-DA45C78E247E}" type="datetimeFigureOut">
               <a:rPr lang="en-CA" smtClean="0"/>
-              <a:t>2016-11-21</a:t>
+              <a:t>2016-11-22</a:t>
             </a:fld>
             <a:endParaRPr lang="en-CA"/>
           </a:p>
@@ -4924,7 +4924,7 @@
           <a:p>
             <a:fld id="{9B1F1BED-FA34-4EDB-9E83-DA45C78E247E}" type="datetimeFigureOut">
               <a:rPr lang="en-CA" smtClean="0"/>
-              <a:t>2016-11-21</a:t>
+              <a:t>2016-11-22</a:t>
             </a:fld>
             <a:endParaRPr lang="en-CA"/>
           </a:p>
@@ -5291,7 +5291,7 @@
           <a:p>
             <a:fld id="{9B1F1BED-FA34-4EDB-9E83-DA45C78E247E}" type="datetimeFigureOut">
               <a:rPr lang="en-CA" smtClean="0"/>
-              <a:t>2016-11-21</a:t>
+              <a:t>2016-11-22</a:t>
             </a:fld>
             <a:endParaRPr lang="en-CA"/>
           </a:p>
@@ -5409,7 +5409,7 @@
           <a:p>
             <a:fld id="{9B1F1BED-FA34-4EDB-9E83-DA45C78E247E}" type="datetimeFigureOut">
               <a:rPr lang="en-CA" smtClean="0"/>
-              <a:t>2016-11-21</a:t>
+              <a:t>2016-11-22</a:t>
             </a:fld>
             <a:endParaRPr lang="en-CA"/>
           </a:p>
@@ -5504,7 +5504,7 @@
           <a:p>
             <a:fld id="{9B1F1BED-FA34-4EDB-9E83-DA45C78E247E}" type="datetimeFigureOut">
               <a:rPr lang="en-CA" smtClean="0"/>
-              <a:t>2016-11-21</a:t>
+              <a:t>2016-11-22</a:t>
             </a:fld>
             <a:endParaRPr lang="en-CA"/>
           </a:p>
@@ -5781,7 +5781,7 @@
           <a:p>
             <a:fld id="{9B1F1BED-FA34-4EDB-9E83-DA45C78E247E}" type="datetimeFigureOut">
               <a:rPr lang="en-CA" smtClean="0"/>
-              <a:t>2016-11-21</a:t>
+              <a:t>2016-11-22</a:t>
             </a:fld>
             <a:endParaRPr lang="en-CA"/>
           </a:p>
@@ -6034,7 +6034,7 @@
           <a:p>
             <a:fld id="{9B1F1BED-FA34-4EDB-9E83-DA45C78E247E}" type="datetimeFigureOut">
               <a:rPr lang="en-CA" smtClean="0"/>
-              <a:t>2016-11-21</a:t>
+              <a:t>2016-11-22</a:t>
             </a:fld>
             <a:endParaRPr lang="en-CA"/>
           </a:p>
@@ -6247,7 +6247,7 @@
           <a:p>
             <a:fld id="{9B1F1BED-FA34-4EDB-9E83-DA45C78E247E}" type="datetimeFigureOut">
               <a:rPr lang="en-CA" smtClean="0"/>
-              <a:t>2016-11-21</a:t>
+              <a:t>2016-11-22</a:t>
             </a:fld>
             <a:endParaRPr lang="en-CA"/>
           </a:p>
@@ -6851,6 +6851,42 @@
               <a:rPr lang="en-US" sz="2800" dirty="0"/>
               <a:t>Create failure audits</a:t>
             </a:r>
+          </a:p>
+        </p:txBody>
+      </p:sp>
+      <p:sp>
+        <p:nvSpPr>
+          <p:cNvPr id="2" name="TextBox 1"/>
+          <p:cNvSpPr txBox="1"/>
+          <p:nvPr/>
+        </p:nvSpPr>
+        <p:spPr>
+          <a:xfrm>
+            <a:off x="111318" y="6492240"/>
+            <a:ext cx="11994543" cy="276999"/>
+          </a:xfrm>
+          <a:prstGeom prst="rect">
+            <a:avLst/>
+          </a:prstGeom>
+          <a:noFill/>
+        </p:spPr>
+        <p:txBody>
+          <a:bodyPr wrap="square" rtlCol="0">
+            <a:spAutoFit/>
+          </a:bodyPr>
+          <a:lstStyle/>
+          <a:p>
+            <a:r>
+              <a:rPr lang="en-US" sz="1200" dirty="0"/>
+              <a:t>GH issue #971: </a:t>
+            </a:r>
+            <a:r>
+              <a:rPr lang="en-US" sz="1200" dirty="0">
+                <a:hlinkClick r:id="rId2"/>
+              </a:rPr>
+              <a:t>Cannot perform runtime binding on a null reference</a:t>
+            </a:r>
+            <a:endParaRPr lang="en-CA" sz="1200" dirty="0"/>
           </a:p>
         </p:txBody>
       </p:sp>

</xml_diff>